<commit_message>
add the workflow placeholder slide
</commit_message>
<xml_diff>
--- a/slides/ssdn-present.pptx
+++ b/slides/ssdn-present.pptx
@@ -5,10 +5,10 @@
     <p:sldMasterId id="2147483660" r:id="rId1"/>
   </p:sldMasterIdLst>
   <p:notesMasterIdLst>
-    <p:notesMasterId r:id="rId11"/>
+    <p:notesMasterId r:id="rId12"/>
   </p:notesMasterIdLst>
   <p:handoutMasterIdLst>
-    <p:handoutMasterId r:id="rId12"/>
+    <p:handoutMasterId r:id="rId13"/>
   </p:handoutMasterIdLst>
   <p:sldIdLst>
     <p:sldId id="284" r:id="rId2"/>
@@ -16,10 +16,11 @@
     <p:sldId id="287" r:id="rId4"/>
     <p:sldId id="282" r:id="rId5"/>
     <p:sldId id="288" r:id="rId6"/>
-    <p:sldId id="289" r:id="rId7"/>
-    <p:sldId id="280" r:id="rId8"/>
-    <p:sldId id="274" r:id="rId9"/>
-    <p:sldId id="285" r:id="rId10"/>
+    <p:sldId id="290" r:id="rId7"/>
+    <p:sldId id="289" r:id="rId8"/>
+    <p:sldId id="280" r:id="rId9"/>
+    <p:sldId id="274" r:id="rId10"/>
+    <p:sldId id="285" r:id="rId11"/>
   </p:sldIdLst>
   <p:sldSz cx="12192000" cy="6858000"/>
   <p:notesSz cx="6858000" cy="9144000"/>
@@ -4650,6 +4651,1184 @@
 </p:sld>
 </file>
 
+<file path=ppt/slides/slide10.xml><?xml version="1.0" encoding="utf-8"?>
+<p:sld xmlns:a="http://schemas.openxmlformats.org/drawingml/2006/main" xmlns:r="http://schemas.openxmlformats.org/officeDocument/2006/relationships" xmlns:p="http://schemas.openxmlformats.org/presentationml/2006/main">
+  <p:cSld>
+    <p:spTree>
+      <p:nvGrpSpPr>
+        <p:cNvPr id="1" name=""/>
+        <p:cNvGrpSpPr/>
+        <p:nvPr/>
+      </p:nvGrpSpPr>
+      <p:grpSpPr>
+        <a:xfrm>
+          <a:off x="0" y="0"/>
+          <a:ext cx="0" cy="0"/>
+          <a:chOff x="0" y="0"/>
+          <a:chExt cx="0" cy="0"/>
+        </a:xfrm>
+      </p:grpSpPr>
+      <p:sp>
+        <p:nvSpPr>
+          <p:cNvPr id="43009" name="Title 2"/>
+          <p:cNvSpPr>
+            <a:spLocks noGrp="1"/>
+          </p:cNvSpPr>
+          <p:nvPr>
+            <p:ph type="title"/>
+          </p:nvPr>
+        </p:nvSpPr>
+        <p:spPr>
+          <a:xfrm>
+            <a:off x="838200" y="365125"/>
+            <a:ext cx="10515600" cy="798657"/>
+          </a:xfrm>
+        </p:spPr>
+        <p:txBody>
+          <a:bodyPr/>
+          <a:lstStyle/>
+          <a:p>
+            <a:pPr algn="ctr"/>
+            <a:r>
+              <a:rPr lang="en-US" altLang="en-US" sz="2800" dirty="0" smtClean="0"/>
+              <a:t>Problem</a:t>
+            </a:r>
+            <a:endParaRPr lang="en-US" altLang="en-US" sz="2800" dirty="0"/>
+          </a:p>
+        </p:txBody>
+      </p:sp>
+      <p:sp>
+        <p:nvSpPr>
+          <p:cNvPr id="3" name="Content Placeholder 2"/>
+          <p:cNvSpPr>
+            <a:spLocks noGrp="1"/>
+          </p:cNvSpPr>
+          <p:nvPr>
+            <p:ph idx="1"/>
+          </p:nvPr>
+        </p:nvSpPr>
+        <p:spPr>
+          <a:xfrm>
+            <a:off x="838199" y="1052945"/>
+            <a:ext cx="11242965" cy="5124018"/>
+          </a:xfrm>
+        </p:spPr>
+        <p:txBody>
+          <a:bodyPr/>
+          <a:lstStyle/>
+          <a:p>
+            <a:r>
+              <a:rPr lang="en-US" sz="2400" dirty="0" smtClean="0"/>
+              <a:t>Super computing can benefit from super efficient and super flexible infrastructures</a:t>
+            </a:r>
+          </a:p>
+          <a:p>
+            <a:r>
+              <a:rPr lang="en-US" sz="2400" dirty="0" smtClean="0"/>
+              <a:t>Traditional networks are not flexible and often cannot use network resources efficiently</a:t>
+            </a:r>
+          </a:p>
+          <a:p>
+            <a:r>
+              <a:rPr lang="en-US" sz="2400" dirty="0" smtClean="0"/>
+              <a:t>Emergence of SDN promises super efficient and flexible networks but current SDN control programming systems are low level, limited in key capabilities</a:t>
+            </a:r>
+          </a:p>
+        </p:txBody>
+      </p:sp>
+      <p:sp>
+        <p:nvSpPr>
+          <p:cNvPr id="5" name="Rectangle 4"/>
+          <p:cNvSpPr/>
+          <p:nvPr/>
+        </p:nvSpPr>
+        <p:spPr bwMode="auto">
+          <a:xfrm>
+            <a:off x="1594749" y="3473460"/>
+            <a:ext cx="8307295" cy="1740812"/>
+          </a:xfrm>
+          <a:prstGeom prst="rect">
+            <a:avLst/>
+          </a:prstGeom>
+          <a:solidFill>
+            <a:srgbClr val="4F81BD"/>
+          </a:solidFill>
+          <a:ln w="9525" cap="flat" cmpd="sng" algn="ctr">
+            <a:solidFill>
+              <a:sysClr val="windowText" lastClr="000000"/>
+            </a:solidFill>
+            <a:prstDash val="solid"/>
+            <a:round/>
+            <a:headEnd type="none" w="med" len="med"/>
+            <a:tailEnd type="none" w="med" len="med"/>
+          </a:ln>
+          <a:effectLst/>
+        </p:spPr>
+        <p:txBody>
+          <a:bodyPr vert="horz" wrap="square" lIns="91440" tIns="45720" rIns="91440" bIns="45720" numCol="1" rtlCol="0" anchor="t" anchorCtr="0" compatLnSpc="1">
+            <a:prstTxWarp prst="textNoShape">
+              <a:avLst/>
+            </a:prstTxWarp>
+          </a:bodyPr>
+          <a:lstStyle/>
+          <a:p>
+            <a:pPr marL="0" marR="0" lvl="0" indent="0" algn="l" defTabSz="914400" rtl="0" eaLnBrk="0" fontAlgn="base" latinLnBrk="0" hangingPunct="0">
+              <a:lnSpc>
+                <a:spcPct val="100000"/>
+              </a:lnSpc>
+              <a:spcBef>
+                <a:spcPct val="0"/>
+              </a:spcBef>
+              <a:spcAft>
+                <a:spcPct val="0"/>
+              </a:spcAft>
+              <a:buClrTx/>
+              <a:buSzTx/>
+              <a:buFontTx/>
+              <a:buNone/>
+              <a:tabLst/>
+              <a:defRPr/>
+            </a:pPr>
+            <a:endParaRPr kumimoji="0" lang="en-US" sz="2400" b="0" i="0" u="none" strike="noStrike" kern="0" cap="none" spc="0" normalizeH="0" baseline="-25000" noProof="0">
+              <a:ln>
+                <a:noFill/>
+              </a:ln>
+              <a:solidFill>
+                <a:sysClr val="windowText" lastClr="000000"/>
+              </a:solidFill>
+              <a:effectLst>
+                <a:outerShdw blurRad="38100" dist="38100" dir="2700000" algn="tl">
+                  <a:srgbClr val="000000">
+                    <a:alpha val="43137"/>
+                  </a:srgbClr>
+                </a:outerShdw>
+              </a:effectLst>
+              <a:uLnTx/>
+              <a:uFillTx/>
+              <a:latin typeface="Arial" pitchFamily="-105" charset="0"/>
+              <a:ea typeface="ＭＳ Ｐゴシック" pitchFamily="-105" charset="-128"/>
+              <a:cs typeface="ＭＳ Ｐゴシック" pitchFamily="-105" charset="-128"/>
+            </a:endParaRPr>
+          </a:p>
+        </p:txBody>
+      </p:sp>
+      <p:sp>
+        <p:nvSpPr>
+          <p:cNvPr id="6" name="Rectangle 5"/>
+          <p:cNvSpPr/>
+          <p:nvPr/>
+        </p:nvSpPr>
+        <p:spPr>
+          <a:xfrm>
+            <a:off x="1832127" y="4407953"/>
+            <a:ext cx="1374589" cy="660046"/>
+          </a:xfrm>
+          <a:prstGeom prst="rect">
+            <a:avLst/>
+          </a:prstGeom>
+          <a:gradFill rotWithShape="1">
+            <a:gsLst>
+              <a:gs pos="0">
+                <a:srgbClr val="9E9273">
+                  <a:tint val="100000"/>
+                  <a:shade val="100000"/>
+                  <a:satMod val="130000"/>
+                </a:srgbClr>
+              </a:gs>
+              <a:gs pos="100000">
+                <a:srgbClr val="9E9273">
+                  <a:tint val="50000"/>
+                  <a:shade val="100000"/>
+                  <a:satMod val="350000"/>
+                </a:srgbClr>
+              </a:gs>
+            </a:gsLst>
+            <a:lin ang="16200000" scaled="0"/>
+          </a:gradFill>
+          <a:ln>
+            <a:noFill/>
+          </a:ln>
+          <a:effectLst>
+            <a:outerShdw blurRad="40000" dist="23000" dir="5400000" rotWithShape="0">
+              <a:srgbClr val="000000">
+                <a:alpha val="35000"/>
+              </a:srgbClr>
+            </a:outerShdw>
+          </a:effectLst>
+          <a:scene3d>
+            <a:camera prst="orthographicFront">
+              <a:rot lat="0" lon="0" rev="0"/>
+            </a:camera>
+            <a:lightRig rig="threePt" dir="t">
+              <a:rot lat="0" lon="0" rev="1200000"/>
+            </a:lightRig>
+          </a:scene3d>
+          <a:sp3d>
+            <a:bevelT w="63500" h="25400"/>
+          </a:sp3d>
+        </p:spPr>
+        <p:txBody>
+          <a:bodyPr tIns="18288" rtlCol="0" anchor="ctr"/>
+          <a:lstStyle/>
+          <a:p>
+            <a:pPr algn="ctr" eaLnBrk="1" fontAlgn="auto" hangingPunct="1">
+              <a:spcBef>
+                <a:spcPts val="0"/>
+              </a:spcBef>
+              <a:spcAft>
+                <a:spcPts val="0"/>
+              </a:spcAft>
+            </a:pPr>
+            <a:r>
+              <a:rPr lang="en-US" baseline="0" noProof="0" dirty="0" smtClean="0">
+                <a:solidFill>
+                  <a:srgbClr val="000090"/>
+                </a:solidFill>
+                <a:latin typeface="Arial" pitchFamily="-105" charset="0"/>
+                <a:ea typeface="ＭＳ Ｐゴシック" pitchFamily="-105" charset="-128"/>
+                <a:cs typeface="ＭＳ Ｐゴシック" pitchFamily="-105" charset="-128"/>
+              </a:rPr>
+              <a:t>Network</a:t>
+            </a:r>
+            <a:br>
+              <a:rPr lang="en-US" baseline="0" noProof="0" dirty="0" smtClean="0">
+                <a:solidFill>
+                  <a:srgbClr val="000090"/>
+                </a:solidFill>
+                <a:latin typeface="Arial" pitchFamily="-105" charset="0"/>
+                <a:ea typeface="ＭＳ Ｐゴシック" pitchFamily="-105" charset="-128"/>
+                <a:cs typeface="ＭＳ Ｐゴシック" pitchFamily="-105" charset="-128"/>
+              </a:rPr>
+            </a:br>
+            <a:r>
+              <a:rPr lang="en-US" baseline="0" noProof="0" dirty="0" smtClean="0">
+                <a:solidFill>
+                  <a:srgbClr val="000090"/>
+                </a:solidFill>
+                <a:latin typeface="Arial" pitchFamily="-105" charset="0"/>
+                <a:ea typeface="ＭＳ Ｐゴシック" pitchFamily="-105" charset="-128"/>
+                <a:cs typeface="ＭＳ Ｐゴシック" pitchFamily="-105" charset="-128"/>
+              </a:rPr>
+              <a:t>State</a:t>
+            </a:r>
+            <a:endParaRPr kumimoji="0" lang="en-US" i="0" u="none" strike="noStrike" kern="0" cap="none" spc="0" normalizeH="0" baseline="0" noProof="0" dirty="0">
+              <a:ln>
+                <a:noFill/>
+              </a:ln>
+              <a:solidFill>
+                <a:srgbClr val="000090"/>
+              </a:solidFill>
+              <a:effectLst/>
+              <a:uLnTx/>
+              <a:uFillTx/>
+              <a:latin typeface="Calibri"/>
+              <a:ea typeface="+mn-ea"/>
+              <a:cs typeface="+mn-cs"/>
+            </a:endParaRPr>
+          </a:p>
+        </p:txBody>
+      </p:sp>
+      <p:sp>
+        <p:nvSpPr>
+          <p:cNvPr id="7" name="Rectangle 6"/>
+          <p:cNvSpPr/>
+          <p:nvPr/>
+        </p:nvSpPr>
+        <p:spPr>
+          <a:xfrm>
+            <a:off x="6928752" y="3987725"/>
+            <a:ext cx="1165411" cy="808144"/>
+          </a:xfrm>
+          <a:prstGeom prst="rect">
+            <a:avLst/>
+          </a:prstGeom>
+          <a:gradFill rotWithShape="1">
+            <a:gsLst>
+              <a:gs pos="0">
+                <a:srgbClr val="9E9273">
+                  <a:tint val="100000"/>
+                  <a:shade val="100000"/>
+                  <a:satMod val="130000"/>
+                </a:srgbClr>
+              </a:gs>
+              <a:gs pos="100000">
+                <a:srgbClr val="9E9273">
+                  <a:tint val="50000"/>
+                  <a:shade val="100000"/>
+                  <a:satMod val="350000"/>
+                </a:srgbClr>
+              </a:gs>
+            </a:gsLst>
+            <a:lin ang="16200000" scaled="0"/>
+          </a:gradFill>
+          <a:ln>
+            <a:noFill/>
+          </a:ln>
+          <a:effectLst>
+            <a:outerShdw blurRad="40000" dist="23000" dir="5400000" rotWithShape="0">
+              <a:srgbClr val="000000">
+                <a:alpha val="35000"/>
+              </a:srgbClr>
+            </a:outerShdw>
+          </a:effectLst>
+          <a:scene3d>
+            <a:camera prst="orthographicFront">
+              <a:rot lat="0" lon="0" rev="0"/>
+            </a:camera>
+            <a:lightRig rig="threePt" dir="t">
+              <a:rot lat="0" lon="0" rev="1200000"/>
+            </a:lightRig>
+          </a:scene3d>
+          <a:sp3d>
+            <a:bevelT w="63500" h="25400"/>
+          </a:sp3d>
+        </p:spPr>
+        <p:txBody>
+          <a:bodyPr tIns="18288" rtlCol="0" anchor="ctr"/>
+          <a:lstStyle/>
+          <a:p>
+            <a:pPr algn="ctr" eaLnBrk="1" fontAlgn="auto" hangingPunct="1">
+              <a:spcBef>
+                <a:spcPts val="0"/>
+              </a:spcBef>
+              <a:spcAft>
+                <a:spcPts val="0"/>
+              </a:spcAft>
+            </a:pPr>
+            <a:r>
+              <a:rPr lang="en-US" altLang="zh-CN" sz="1800" baseline="0" dirty="0" err="1" smtClean="0">
+                <a:solidFill>
+                  <a:srgbClr val="000090"/>
+                </a:solidFill>
+                <a:latin typeface="Arial" pitchFamily="-105" charset="0"/>
+                <a:ea typeface="ＭＳ Ｐゴシック" pitchFamily="-105" charset="-128"/>
+                <a:cs typeface="ＭＳ Ｐゴシック" pitchFamily="-105" charset="-128"/>
+              </a:rPr>
+              <a:t>Datapath</a:t>
+            </a:r>
+            <a:r>
+              <a:rPr lang="en-US" altLang="zh-CN" sz="1800" baseline="0" dirty="0" smtClean="0">
+                <a:solidFill>
+                  <a:srgbClr val="000090"/>
+                </a:solidFill>
+                <a:latin typeface="Arial" pitchFamily="-105" charset="0"/>
+                <a:ea typeface="ＭＳ Ｐゴシック" pitchFamily="-105" charset="-128"/>
+                <a:cs typeface="ＭＳ Ｐゴシック" pitchFamily="-105" charset="-128"/>
+              </a:rPr>
+              <a:t/>
+            </a:r>
+            <a:br>
+              <a:rPr lang="en-US" altLang="zh-CN" sz="1800" baseline="0" dirty="0" smtClean="0">
+                <a:solidFill>
+                  <a:srgbClr val="000090"/>
+                </a:solidFill>
+                <a:latin typeface="Arial" pitchFamily="-105" charset="0"/>
+                <a:ea typeface="ＭＳ Ｐゴシック" pitchFamily="-105" charset="-128"/>
+                <a:cs typeface="ＭＳ Ｐゴシック" pitchFamily="-105" charset="-128"/>
+              </a:rPr>
+            </a:br>
+            <a:r>
+              <a:rPr lang="en-US" altLang="zh-CN" sz="1800" baseline="0" dirty="0" smtClean="0">
+                <a:solidFill>
+                  <a:srgbClr val="000090"/>
+                </a:solidFill>
+                <a:latin typeface="Arial" pitchFamily="-105" charset="0"/>
+                <a:ea typeface="ＭＳ Ｐゴシック" pitchFamily="-105" charset="-128"/>
+                <a:cs typeface="ＭＳ Ｐゴシック" pitchFamily="-105" charset="-128"/>
+              </a:rPr>
+              <a:t>Model</a:t>
+            </a:r>
+            <a:endParaRPr kumimoji="0" lang="en-US" sz="1800" i="0" u="none" strike="noStrike" kern="0" cap="none" spc="0" normalizeH="0" baseline="0" noProof="0" dirty="0">
+              <a:ln>
+                <a:noFill/>
+              </a:ln>
+              <a:solidFill>
+                <a:srgbClr val="000090"/>
+              </a:solidFill>
+              <a:effectLst/>
+              <a:uLnTx/>
+              <a:uFillTx/>
+              <a:latin typeface="Calibri"/>
+              <a:ea typeface="+mn-ea"/>
+              <a:cs typeface="+mn-cs"/>
+            </a:endParaRPr>
+          </a:p>
+        </p:txBody>
+      </p:sp>
+      <p:sp>
+        <p:nvSpPr>
+          <p:cNvPr id="8" name="Rectangle 7"/>
+          <p:cNvSpPr/>
+          <p:nvPr/>
+        </p:nvSpPr>
+        <p:spPr>
+          <a:xfrm>
+            <a:off x="1811738" y="3604092"/>
+            <a:ext cx="1401733" cy="648794"/>
+          </a:xfrm>
+          <a:prstGeom prst="rect">
+            <a:avLst/>
+          </a:prstGeom>
+          <a:gradFill rotWithShape="1">
+            <a:gsLst>
+              <a:gs pos="0">
+                <a:srgbClr val="9E9273">
+                  <a:tint val="100000"/>
+                  <a:shade val="100000"/>
+                  <a:satMod val="130000"/>
+                </a:srgbClr>
+              </a:gs>
+              <a:gs pos="100000">
+                <a:srgbClr val="9E9273">
+                  <a:tint val="50000"/>
+                  <a:shade val="100000"/>
+                  <a:satMod val="350000"/>
+                </a:srgbClr>
+              </a:gs>
+            </a:gsLst>
+            <a:lin ang="16200000" scaled="0"/>
+          </a:gradFill>
+          <a:ln>
+            <a:noFill/>
+          </a:ln>
+          <a:effectLst>
+            <a:outerShdw blurRad="40000" dist="23000" dir="5400000" rotWithShape="0">
+              <a:srgbClr val="000000">
+                <a:alpha val="35000"/>
+              </a:srgbClr>
+            </a:outerShdw>
+          </a:effectLst>
+          <a:scene3d>
+            <a:camera prst="orthographicFront">
+              <a:rot lat="0" lon="0" rev="0"/>
+            </a:camera>
+            <a:lightRig rig="threePt" dir="t">
+              <a:rot lat="0" lon="0" rev="1200000"/>
+            </a:lightRig>
+          </a:scene3d>
+          <a:sp3d>
+            <a:bevelT w="63500" h="25400"/>
+          </a:sp3d>
+        </p:spPr>
+        <p:txBody>
+          <a:bodyPr tIns="18288" rtlCol="0" anchor="ctr"/>
+          <a:lstStyle/>
+          <a:p>
+            <a:pPr algn="ctr" eaLnBrk="1" fontAlgn="auto" hangingPunct="1">
+              <a:spcBef>
+                <a:spcPts val="0"/>
+              </a:spcBef>
+              <a:spcAft>
+                <a:spcPts val="0"/>
+              </a:spcAft>
+            </a:pPr>
+            <a:r>
+              <a:rPr lang="en-US" baseline="0" noProof="0" dirty="0" smtClean="0">
+                <a:solidFill>
+                  <a:srgbClr val="000090"/>
+                </a:solidFill>
+                <a:latin typeface="Arial" pitchFamily="-105" charset="0"/>
+                <a:ea typeface="ＭＳ Ｐゴシック" pitchFamily="-105" charset="-128"/>
+                <a:cs typeface="ＭＳ Ｐゴシック" pitchFamily="-105" charset="-128"/>
+              </a:rPr>
+              <a:t>Service</a:t>
+            </a:r>
+            <a:r>
+              <a:rPr lang="en-US" baseline="0" dirty="0">
+                <a:solidFill>
+                  <a:srgbClr val="000090"/>
+                </a:solidFill>
+                <a:latin typeface="Arial" pitchFamily="-105" charset="0"/>
+                <a:ea typeface="ＭＳ Ｐゴシック" pitchFamily="-105" charset="-128"/>
+                <a:cs typeface="ＭＳ Ｐゴシック" pitchFamily="-105" charset="-128"/>
+              </a:rPr>
+              <a:t>/</a:t>
+            </a:r>
+            <a:r>
+              <a:rPr lang="en-US" baseline="0" noProof="0" dirty="0" smtClean="0">
+                <a:solidFill>
+                  <a:srgbClr val="000090"/>
+                </a:solidFill>
+                <a:latin typeface="Arial" pitchFamily="-105" charset="0"/>
+                <a:ea typeface="ＭＳ Ｐゴシック" pitchFamily="-105" charset="-128"/>
+                <a:cs typeface="ＭＳ Ｐゴシック" pitchFamily="-105" charset="-128"/>
+              </a:rPr>
+              <a:t/>
+            </a:r>
+            <a:br>
+              <a:rPr lang="en-US" baseline="0" noProof="0" dirty="0" smtClean="0">
+                <a:solidFill>
+                  <a:srgbClr val="000090"/>
+                </a:solidFill>
+                <a:latin typeface="Arial" pitchFamily="-105" charset="0"/>
+                <a:ea typeface="ＭＳ Ｐゴシック" pitchFamily="-105" charset="-128"/>
+                <a:cs typeface="ＭＳ Ｐゴシック" pitchFamily="-105" charset="-128"/>
+              </a:rPr>
+            </a:br>
+            <a:r>
+              <a:rPr lang="en-US" baseline="0" noProof="0" dirty="0" smtClean="0">
+                <a:solidFill>
+                  <a:srgbClr val="000090"/>
+                </a:solidFill>
+                <a:latin typeface="Arial" pitchFamily="-105" charset="0"/>
+                <a:ea typeface="ＭＳ Ｐゴシック" pitchFamily="-105" charset="-128"/>
+                <a:cs typeface="ＭＳ Ｐゴシック" pitchFamily="-105" charset="-128"/>
+              </a:rPr>
+              <a:t>Policy</a:t>
+            </a:r>
+            <a:endParaRPr kumimoji="0" lang="en-US" i="0" u="none" strike="noStrike" kern="0" cap="none" spc="0" normalizeH="0" baseline="0" noProof="0" dirty="0">
+              <a:ln>
+                <a:noFill/>
+              </a:ln>
+              <a:solidFill>
+                <a:srgbClr val="000090"/>
+              </a:solidFill>
+              <a:effectLst/>
+              <a:uLnTx/>
+              <a:uFillTx/>
+              <a:latin typeface="Calibri"/>
+              <a:ea typeface="+mn-ea"/>
+              <a:cs typeface="+mn-cs"/>
+            </a:endParaRPr>
+          </a:p>
+        </p:txBody>
+      </p:sp>
+      <p:sp>
+        <p:nvSpPr>
+          <p:cNvPr id="9" name="Rectangle 8"/>
+          <p:cNvSpPr/>
+          <p:nvPr/>
+        </p:nvSpPr>
+        <p:spPr bwMode="auto">
+          <a:xfrm>
+            <a:off x="6749456" y="3708352"/>
+            <a:ext cx="2913529" cy="1359647"/>
+          </a:xfrm>
+          <a:prstGeom prst="rect">
+            <a:avLst/>
+          </a:prstGeom>
+          <a:noFill/>
+          <a:ln w="3175" cap="flat" cmpd="sng" algn="ctr">
+            <a:solidFill>
+              <a:srgbClr val="F79646">
+                <a:lumMod val="50000"/>
+              </a:srgbClr>
+            </a:solidFill>
+            <a:prstDash val="dash"/>
+            <a:round/>
+            <a:headEnd type="none" w="med" len="med"/>
+            <a:tailEnd type="none" w="med" len="med"/>
+          </a:ln>
+          <a:effectLst/>
+        </p:spPr>
+        <p:txBody>
+          <a:bodyPr vert="horz" wrap="square" lIns="91440" tIns="45720" rIns="91440" bIns="45720" numCol="1" rtlCol="0" anchor="t" anchorCtr="0" compatLnSpc="1">
+            <a:prstTxWarp prst="textNoShape">
+              <a:avLst/>
+            </a:prstTxWarp>
+          </a:bodyPr>
+          <a:lstStyle/>
+          <a:p>
+            <a:pPr marL="0" marR="0" lvl="0" indent="0" algn="l" defTabSz="914400" rtl="0" eaLnBrk="0" fontAlgn="base" latinLnBrk="0" hangingPunct="0">
+              <a:lnSpc>
+                <a:spcPct val="100000"/>
+              </a:lnSpc>
+              <a:spcBef>
+                <a:spcPct val="0"/>
+              </a:spcBef>
+              <a:spcAft>
+                <a:spcPct val="0"/>
+              </a:spcAft>
+              <a:buClrTx/>
+              <a:buSzTx/>
+              <a:buFontTx/>
+              <a:buNone/>
+              <a:tabLst/>
+              <a:defRPr/>
+            </a:pPr>
+            <a:endParaRPr kumimoji="0" lang="en-US" sz="2400" b="0" i="0" u="none" strike="noStrike" kern="0" cap="none" spc="0" normalizeH="0" baseline="-25000" noProof="0">
+              <a:ln>
+                <a:noFill/>
+              </a:ln>
+              <a:solidFill>
+                <a:sysClr val="windowText" lastClr="000000"/>
+              </a:solidFill>
+              <a:effectLst>
+                <a:outerShdw blurRad="38100" dist="38100" dir="2700000" algn="tl">
+                  <a:srgbClr val="000000">
+                    <a:alpha val="43137"/>
+                  </a:srgbClr>
+                </a:outerShdw>
+              </a:effectLst>
+              <a:uLnTx/>
+              <a:uFillTx/>
+              <a:latin typeface="Arial" pitchFamily="-105" charset="0"/>
+              <a:ea typeface="ＭＳ Ｐゴシック" pitchFamily="-105" charset="-128"/>
+              <a:cs typeface="ＭＳ Ｐゴシック" pitchFamily="-105" charset="-128"/>
+            </a:endParaRPr>
+          </a:p>
+        </p:txBody>
+      </p:sp>
+      <p:sp>
+        <p:nvSpPr>
+          <p:cNvPr id="10" name="Rectangle 9"/>
+          <p:cNvSpPr/>
+          <p:nvPr/>
+        </p:nvSpPr>
+        <p:spPr>
+          <a:xfrm>
+            <a:off x="8321270" y="3990713"/>
+            <a:ext cx="1165411" cy="808144"/>
+          </a:xfrm>
+          <a:prstGeom prst="rect">
+            <a:avLst/>
+          </a:prstGeom>
+          <a:gradFill rotWithShape="1">
+            <a:gsLst>
+              <a:gs pos="0">
+                <a:srgbClr val="9E9273">
+                  <a:tint val="100000"/>
+                  <a:shade val="100000"/>
+                  <a:satMod val="130000"/>
+                </a:srgbClr>
+              </a:gs>
+              <a:gs pos="100000">
+                <a:srgbClr val="9E9273">
+                  <a:tint val="50000"/>
+                  <a:shade val="100000"/>
+                  <a:satMod val="350000"/>
+                </a:srgbClr>
+              </a:gs>
+            </a:gsLst>
+            <a:lin ang="16200000" scaled="0"/>
+          </a:gradFill>
+          <a:ln>
+            <a:noFill/>
+          </a:ln>
+          <a:effectLst>
+            <a:outerShdw blurRad="40000" dist="23000" dir="5400000" rotWithShape="0">
+              <a:srgbClr val="000000">
+                <a:alpha val="35000"/>
+              </a:srgbClr>
+            </a:outerShdw>
+          </a:effectLst>
+          <a:scene3d>
+            <a:camera prst="orthographicFront">
+              <a:rot lat="0" lon="0" rev="0"/>
+            </a:camera>
+            <a:lightRig rig="threePt" dir="t">
+              <a:rot lat="0" lon="0" rev="1200000"/>
+            </a:lightRig>
+          </a:scene3d>
+          <a:sp3d>
+            <a:bevelT w="63500" h="25400"/>
+          </a:sp3d>
+        </p:spPr>
+        <p:txBody>
+          <a:bodyPr tIns="18288" rtlCol="0" anchor="ctr"/>
+          <a:lstStyle/>
+          <a:p>
+            <a:pPr algn="ctr" eaLnBrk="1" fontAlgn="auto" hangingPunct="1">
+              <a:spcBef>
+                <a:spcPts val="0"/>
+              </a:spcBef>
+              <a:spcAft>
+                <a:spcPts val="0"/>
+              </a:spcAft>
+            </a:pPr>
+            <a:r>
+              <a:rPr lang="en-US" altLang="zh-CN" sz="1800" baseline="0" dirty="0" err="1" smtClean="0">
+                <a:solidFill>
+                  <a:srgbClr val="000090"/>
+                </a:solidFill>
+                <a:latin typeface="Arial" pitchFamily="-105" charset="0"/>
+                <a:ea typeface="ＭＳ Ｐゴシック" pitchFamily="-105" charset="-128"/>
+                <a:cs typeface="ＭＳ Ｐゴシック" pitchFamily="-105" charset="-128"/>
+              </a:rPr>
+              <a:t>Datapath</a:t>
+            </a:r>
+            <a:r>
+              <a:rPr lang="en-US" altLang="zh-CN" sz="1800" baseline="0" dirty="0" smtClean="0">
+                <a:solidFill>
+                  <a:srgbClr val="000090"/>
+                </a:solidFill>
+                <a:latin typeface="Arial" pitchFamily="-105" charset="0"/>
+                <a:ea typeface="ＭＳ Ｐゴシック" pitchFamily="-105" charset="-128"/>
+                <a:cs typeface="ＭＳ Ｐゴシック" pitchFamily="-105" charset="-128"/>
+              </a:rPr>
+              <a:t/>
+            </a:r>
+            <a:br>
+              <a:rPr lang="en-US" altLang="zh-CN" sz="1800" baseline="0" dirty="0" smtClean="0">
+                <a:solidFill>
+                  <a:srgbClr val="000090"/>
+                </a:solidFill>
+                <a:latin typeface="Arial" pitchFamily="-105" charset="0"/>
+                <a:ea typeface="ＭＳ Ｐゴシック" pitchFamily="-105" charset="-128"/>
+                <a:cs typeface="ＭＳ Ｐゴシック" pitchFamily="-105" charset="-128"/>
+              </a:rPr>
+            </a:br>
+            <a:r>
+              <a:rPr lang="en-US" altLang="zh-CN" sz="1800" baseline="0" dirty="0" smtClean="0">
+                <a:solidFill>
+                  <a:srgbClr val="000090"/>
+                </a:solidFill>
+                <a:latin typeface="Arial" pitchFamily="-105" charset="0"/>
+                <a:ea typeface="ＭＳ Ｐゴシック" pitchFamily="-105" charset="-128"/>
+                <a:cs typeface="ＭＳ Ｐゴシック" pitchFamily="-105" charset="-128"/>
+              </a:rPr>
+              <a:t>Model</a:t>
+            </a:r>
+            <a:endParaRPr kumimoji="0" lang="en-US" sz="1800" i="0" u="none" strike="noStrike" kern="0" cap="none" spc="0" normalizeH="0" baseline="0" noProof="0" dirty="0">
+              <a:ln>
+                <a:noFill/>
+              </a:ln>
+              <a:solidFill>
+                <a:srgbClr val="000090"/>
+              </a:solidFill>
+              <a:effectLst/>
+              <a:uLnTx/>
+              <a:uFillTx/>
+              <a:latin typeface="Calibri"/>
+              <a:ea typeface="+mn-ea"/>
+              <a:cs typeface="+mn-cs"/>
+            </a:endParaRPr>
+          </a:p>
+        </p:txBody>
+      </p:sp>
+      <p:grpSp>
+        <p:nvGrpSpPr>
+          <p:cNvPr id="11" name="Group 10"/>
+          <p:cNvGrpSpPr/>
+          <p:nvPr/>
+        </p:nvGrpSpPr>
+        <p:grpSpPr>
+          <a:xfrm>
+            <a:off x="3173379" y="4716854"/>
+            <a:ext cx="3588651" cy="1321530"/>
+            <a:chOff x="3278081" y="4319980"/>
+            <a:chExt cx="3588651" cy="1321530"/>
+          </a:xfrm>
+        </p:grpSpPr>
+        <p:cxnSp>
+          <p:nvCxnSpPr>
+            <p:cNvPr id="12" name="Straight Arrow Connector 11"/>
+            <p:cNvCxnSpPr>
+              <a:stCxn id="20" idx="0"/>
+            </p:cNvCxnSpPr>
+            <p:nvPr/>
+          </p:nvCxnSpPr>
+          <p:spPr bwMode="auto">
+            <a:xfrm flipH="1" flipV="1">
+              <a:off x="3278081" y="4482101"/>
+              <a:ext cx="1809516" cy="1159409"/>
+            </a:xfrm>
+            <a:prstGeom prst="straightConnector1">
+              <a:avLst/>
+            </a:prstGeom>
+            <a:solidFill>
+              <a:srgbClr val="4F81BD"/>
+            </a:solidFill>
+            <a:ln w="9525" cap="flat" cmpd="sng" algn="ctr">
+              <a:solidFill>
+                <a:sysClr val="windowText" lastClr="000000"/>
+              </a:solidFill>
+              <a:prstDash val="solid"/>
+              <a:round/>
+              <a:headEnd type="none" w="med" len="med"/>
+              <a:tailEnd type="triangle" w="lg" len="med"/>
+            </a:ln>
+            <a:effectLst/>
+          </p:spPr>
+        </p:cxnSp>
+        <p:cxnSp>
+          <p:nvCxnSpPr>
+            <p:cNvPr id="13" name="Straight Arrow Connector 12"/>
+            <p:cNvCxnSpPr>
+              <a:stCxn id="21" idx="0"/>
+            </p:cNvCxnSpPr>
+            <p:nvPr/>
+          </p:nvCxnSpPr>
+          <p:spPr bwMode="auto">
+            <a:xfrm flipH="1" flipV="1">
+              <a:off x="3318615" y="4319980"/>
+              <a:ext cx="3548117" cy="1321530"/>
+            </a:xfrm>
+            <a:prstGeom prst="straightConnector1">
+              <a:avLst/>
+            </a:prstGeom>
+            <a:solidFill>
+              <a:srgbClr val="4F81BD"/>
+            </a:solidFill>
+            <a:ln w="9525" cap="flat" cmpd="sng" algn="ctr">
+              <a:solidFill>
+                <a:sysClr val="windowText" lastClr="000000"/>
+              </a:solidFill>
+              <a:prstDash val="solid"/>
+              <a:round/>
+              <a:headEnd type="none" w="med" len="med"/>
+              <a:tailEnd type="triangle" w="lg" len="med"/>
+            </a:ln>
+            <a:effectLst/>
+          </p:spPr>
+        </p:cxnSp>
+      </p:grpSp>
+      <p:grpSp>
+        <p:nvGrpSpPr>
+          <p:cNvPr id="14" name="Group 13"/>
+          <p:cNvGrpSpPr/>
+          <p:nvPr/>
+        </p:nvGrpSpPr>
+        <p:grpSpPr>
+          <a:xfrm>
+            <a:off x="5307886" y="4795869"/>
+            <a:ext cx="3596091" cy="1204504"/>
+            <a:chOff x="4236079" y="4374576"/>
+            <a:chExt cx="3596091" cy="1204504"/>
+          </a:xfrm>
+        </p:grpSpPr>
+        <p:cxnSp>
+          <p:nvCxnSpPr>
+            <p:cNvPr id="15" name="Straight Arrow Connector 14"/>
+            <p:cNvCxnSpPr/>
+            <p:nvPr/>
+          </p:nvCxnSpPr>
+          <p:spPr bwMode="auto">
+            <a:xfrm flipH="1">
+              <a:off x="4236079" y="4374576"/>
+              <a:ext cx="2203573" cy="1163501"/>
+            </a:xfrm>
+            <a:prstGeom prst="straightConnector1">
+              <a:avLst/>
+            </a:prstGeom>
+            <a:solidFill>
+              <a:srgbClr val="4F81BD"/>
+            </a:solidFill>
+            <a:ln w="9525" cap="flat" cmpd="sng" algn="ctr">
+              <a:solidFill>
+                <a:sysClr val="windowText" lastClr="000000"/>
+              </a:solidFill>
+              <a:prstDash val="solid"/>
+              <a:round/>
+              <a:headEnd type="none" w="med" len="med"/>
+              <a:tailEnd type="triangle" w="lg" len="med"/>
+            </a:ln>
+            <a:effectLst/>
+          </p:spPr>
+        </p:cxnSp>
+        <p:cxnSp>
+          <p:nvCxnSpPr>
+            <p:cNvPr id="16" name="Straight Arrow Connector 15"/>
+            <p:cNvCxnSpPr/>
+            <p:nvPr/>
+          </p:nvCxnSpPr>
+          <p:spPr bwMode="auto">
+            <a:xfrm flipH="1">
+              <a:off x="5856945" y="4377564"/>
+              <a:ext cx="1975225" cy="1201516"/>
+            </a:xfrm>
+            <a:prstGeom prst="straightConnector1">
+              <a:avLst/>
+            </a:prstGeom>
+            <a:solidFill>
+              <a:srgbClr val="4F81BD"/>
+            </a:solidFill>
+            <a:ln w="9525" cap="flat" cmpd="sng" algn="ctr">
+              <a:solidFill>
+                <a:sysClr val="windowText" lastClr="000000"/>
+              </a:solidFill>
+              <a:prstDash val="solid"/>
+              <a:round/>
+              <a:headEnd type="none" w="med" len="med"/>
+              <a:tailEnd type="triangle" w="lg" len="med"/>
+            </a:ln>
+            <a:effectLst/>
+          </p:spPr>
+        </p:cxnSp>
+      </p:grpSp>
+      <p:pic>
+        <p:nvPicPr>
+          <p:cNvPr id="17" name="Picture 16"/>
+          <p:cNvPicPr>
+            <a:picLocks noChangeAspect="1"/>
+          </p:cNvPicPr>
+          <p:nvPr/>
+        </p:nvPicPr>
+        <p:blipFill>
+          <a:blip r:embed="rId2" cstate="print">
+            <a:extLst>
+              <a:ext uri="{28A0092B-C50C-407E-A947-70E740481C1C}">
+                <a14:useLocalDpi xmlns:a14="http://schemas.microsoft.com/office/drawing/2010/main"/>
+              </a:ext>
+            </a:extLst>
+          </a:blip>
+          <a:stretch>
+            <a:fillRect/>
+          </a:stretch>
+        </p:blipFill>
+        <p:spPr>
+          <a:xfrm>
+            <a:off x="4286630" y="5959370"/>
+            <a:ext cx="1445692" cy="609600"/>
+          </a:xfrm>
+          <a:prstGeom prst="rect">
+            <a:avLst/>
+          </a:prstGeom>
+        </p:spPr>
+      </p:pic>
+      <p:pic>
+        <p:nvPicPr>
+          <p:cNvPr id="18" name="Picture 17"/>
+          <p:cNvPicPr>
+            <a:picLocks noChangeAspect="1"/>
+          </p:cNvPicPr>
+          <p:nvPr/>
+        </p:nvPicPr>
+        <p:blipFill>
+          <a:blip r:embed="rId2" cstate="print">
+            <a:extLst>
+              <a:ext uri="{28A0092B-C50C-407E-A947-70E740481C1C}">
+                <a14:useLocalDpi xmlns:a14="http://schemas.microsoft.com/office/drawing/2010/main"/>
+              </a:ext>
+            </a:extLst>
+          </a:blip>
+          <a:stretch>
+            <a:fillRect/>
+          </a:stretch>
+        </p:blipFill>
+        <p:spPr>
+          <a:xfrm>
+            <a:off x="6065765" y="5959370"/>
+            <a:ext cx="1445692" cy="609600"/>
+          </a:xfrm>
+          <a:prstGeom prst="rect">
+            <a:avLst/>
+          </a:prstGeom>
+        </p:spPr>
+      </p:pic>
+      <p:sp>
+        <p:nvSpPr>
+          <p:cNvPr id="19" name="Rectangle 18"/>
+          <p:cNvSpPr/>
+          <p:nvPr/>
+        </p:nvSpPr>
+        <p:spPr>
+          <a:xfrm>
+            <a:off x="4973333" y="3869926"/>
+            <a:ext cx="1165411" cy="808144"/>
+          </a:xfrm>
+          <a:prstGeom prst="rect">
+            <a:avLst/>
+          </a:prstGeom>
+          <a:gradFill rotWithShape="1">
+            <a:gsLst>
+              <a:gs pos="0">
+                <a:srgbClr val="9E9273">
+                  <a:tint val="100000"/>
+                  <a:shade val="100000"/>
+                  <a:satMod val="130000"/>
+                </a:srgbClr>
+              </a:gs>
+              <a:gs pos="100000">
+                <a:srgbClr val="9E9273">
+                  <a:tint val="50000"/>
+                  <a:shade val="100000"/>
+                  <a:satMod val="350000"/>
+                </a:srgbClr>
+              </a:gs>
+            </a:gsLst>
+            <a:lin ang="16200000" scaled="0"/>
+          </a:gradFill>
+          <a:ln>
+            <a:noFill/>
+          </a:ln>
+          <a:effectLst>
+            <a:outerShdw blurRad="40000" dist="23000" dir="5400000" rotWithShape="0">
+              <a:srgbClr val="000000">
+                <a:alpha val="35000"/>
+              </a:srgbClr>
+            </a:outerShdw>
+          </a:effectLst>
+          <a:scene3d>
+            <a:camera prst="orthographicFront">
+              <a:rot lat="0" lon="0" rev="0"/>
+            </a:camera>
+            <a:lightRig rig="threePt" dir="t">
+              <a:rot lat="0" lon="0" rev="1200000"/>
+            </a:lightRig>
+          </a:scene3d>
+          <a:sp3d>
+            <a:bevelT w="63500" h="25400"/>
+          </a:sp3d>
+        </p:spPr>
+        <p:txBody>
+          <a:bodyPr tIns="18288" rtlCol="0" anchor="ctr"/>
+          <a:lstStyle/>
+          <a:p>
+            <a:pPr algn="ctr" eaLnBrk="1" fontAlgn="auto" hangingPunct="1">
+              <a:spcBef>
+                <a:spcPts val="0"/>
+              </a:spcBef>
+              <a:spcAft>
+                <a:spcPts val="0"/>
+              </a:spcAft>
+            </a:pPr>
+            <a:r>
+              <a:rPr lang="en-US" altLang="zh-CN" sz="2000" baseline="0" dirty="0" smtClean="0">
+                <a:solidFill>
+                  <a:srgbClr val="000090"/>
+                </a:solidFill>
+                <a:latin typeface="Arial" pitchFamily="-105" charset="0"/>
+                <a:ea typeface="ＭＳ Ｐゴシック" pitchFamily="-105" charset="-128"/>
+                <a:cs typeface="ＭＳ Ｐゴシック" pitchFamily="-105" charset="-128"/>
+              </a:rPr>
+              <a:t>Program</a:t>
+            </a:r>
+            <a:br>
+              <a:rPr lang="en-US" altLang="zh-CN" sz="2000" baseline="0" dirty="0" smtClean="0">
+                <a:solidFill>
+                  <a:srgbClr val="000090"/>
+                </a:solidFill>
+                <a:latin typeface="Arial" pitchFamily="-105" charset="0"/>
+                <a:ea typeface="ＭＳ Ｐゴシック" pitchFamily="-105" charset="-128"/>
+                <a:cs typeface="ＭＳ Ｐゴシック" pitchFamily="-105" charset="-128"/>
+              </a:rPr>
+            </a:br>
+            <a:r>
+              <a:rPr lang="en-US" altLang="zh-CN" sz="2000" baseline="0" dirty="0" smtClean="0">
+                <a:solidFill>
+                  <a:srgbClr val="000090"/>
+                </a:solidFill>
+                <a:latin typeface="Arial" pitchFamily="-105" charset="0"/>
+                <a:ea typeface="ＭＳ Ｐゴシック" pitchFamily="-105" charset="-128"/>
+                <a:cs typeface="ＭＳ Ｐゴシック" pitchFamily="-105" charset="-128"/>
+              </a:rPr>
+              <a:t>Logic</a:t>
+            </a:r>
+            <a:endParaRPr kumimoji="0" lang="en-US" sz="2000" i="0" u="none" strike="noStrike" kern="0" cap="none" spc="0" normalizeH="0" baseline="0" noProof="0" dirty="0">
+              <a:ln>
+                <a:noFill/>
+              </a:ln>
+              <a:solidFill>
+                <a:srgbClr val="000090"/>
+              </a:solidFill>
+              <a:effectLst/>
+              <a:uLnTx/>
+              <a:uFillTx/>
+              <a:latin typeface="Calibri"/>
+              <a:ea typeface="+mn-ea"/>
+              <a:cs typeface="+mn-cs"/>
+            </a:endParaRPr>
+          </a:p>
+        </p:txBody>
+      </p:sp>
+      <p:cxnSp>
+        <p:nvCxnSpPr>
+          <p:cNvPr id="20" name="Straight Arrow Connector 19"/>
+          <p:cNvCxnSpPr/>
+          <p:nvPr/>
+        </p:nvCxnSpPr>
+        <p:spPr bwMode="auto">
+          <a:xfrm>
+            <a:off x="3213471" y="3718843"/>
+            <a:ext cx="1759862" cy="555155"/>
+          </a:xfrm>
+          <a:prstGeom prst="straightConnector1">
+            <a:avLst/>
+          </a:prstGeom>
+          <a:solidFill>
+            <a:srgbClr val="4F81BD"/>
+          </a:solidFill>
+          <a:ln w="9525" cap="flat" cmpd="sng" algn="ctr">
+            <a:solidFill>
+              <a:sysClr val="windowText" lastClr="000000"/>
+            </a:solidFill>
+            <a:prstDash val="solid"/>
+            <a:round/>
+            <a:headEnd type="none" w="med" len="med"/>
+            <a:tailEnd type="triangle" w="lg" len="med"/>
+          </a:ln>
+          <a:effectLst/>
+        </p:spPr>
+      </p:cxnSp>
+      <p:cxnSp>
+        <p:nvCxnSpPr>
+          <p:cNvPr id="21" name="Straight Arrow Connector 20"/>
+          <p:cNvCxnSpPr/>
+          <p:nvPr/>
+        </p:nvCxnSpPr>
+        <p:spPr bwMode="auto">
+          <a:xfrm flipV="1">
+            <a:off x="6138744" y="4259561"/>
+            <a:ext cx="614776" cy="14437"/>
+          </a:xfrm>
+          <a:prstGeom prst="straightConnector1">
+            <a:avLst/>
+          </a:prstGeom>
+          <a:solidFill>
+            <a:srgbClr val="4F81BD"/>
+          </a:solidFill>
+          <a:ln w="9525" cap="flat" cmpd="sng" algn="ctr">
+            <a:solidFill>
+              <a:sysClr val="windowText" lastClr="000000"/>
+            </a:solidFill>
+            <a:prstDash val="solid"/>
+            <a:round/>
+            <a:headEnd type="none" w="med" len="med"/>
+            <a:tailEnd type="triangle" w="lg" len="med"/>
+          </a:ln>
+          <a:effectLst/>
+        </p:spPr>
+      </p:cxnSp>
+      <p:cxnSp>
+        <p:nvCxnSpPr>
+          <p:cNvPr id="22" name="Straight Arrow Connector 21"/>
+          <p:cNvCxnSpPr/>
+          <p:nvPr/>
+        </p:nvCxnSpPr>
+        <p:spPr bwMode="auto">
+          <a:xfrm flipV="1">
+            <a:off x="3226983" y="4273998"/>
+            <a:ext cx="1746350" cy="363842"/>
+          </a:xfrm>
+          <a:prstGeom prst="straightConnector1">
+            <a:avLst/>
+          </a:prstGeom>
+          <a:solidFill>
+            <a:srgbClr val="4F81BD"/>
+          </a:solidFill>
+          <a:ln w="9525" cap="flat" cmpd="sng" algn="ctr">
+            <a:solidFill>
+              <a:sysClr val="windowText" lastClr="000000"/>
+            </a:solidFill>
+            <a:prstDash val="solid"/>
+            <a:round/>
+            <a:headEnd type="none" w="med" len="med"/>
+            <a:tailEnd type="triangle" w="lg" len="med"/>
+          </a:ln>
+          <a:effectLst/>
+        </p:spPr>
+      </p:cxnSp>
+    </p:spTree>
+    <p:extLst>
+      <p:ext uri="{BB962C8B-B14F-4D97-AF65-F5344CB8AC3E}">
+        <p14:creationId xmlns:p14="http://schemas.microsoft.com/office/powerpoint/2010/main" val="340410705"/>
+      </p:ext>
+    </p:extLst>
+  </p:cSld>
+  <p:clrMapOvr>
+    <a:masterClrMapping/>
+  </p:clrMapOvr>
+  <p:timing>
+    <p:tnLst>
+      <p:par>
+        <p:cTn id="1" dur="indefinite" restart="never" nodeType="tmRoot"/>
+      </p:par>
+    </p:tnLst>
+  </p:timing>
+</p:sld>
+</file>
+
 <file path=ppt/slides/slide2.xml><?xml version="1.0" encoding="utf-8"?>
 <p:sld xmlns:a="http://schemas.openxmlformats.org/drawingml/2006/main" xmlns:r="http://schemas.openxmlformats.org/officeDocument/2006/relationships" xmlns:p="http://schemas.openxmlformats.org/presentationml/2006/main">
   <p:cSld>
@@ -4694,11 +5873,7 @@
             </a:r>
             <a:r>
               <a:rPr lang="en-US" altLang="en-US" sz="3600" b="1" u="sng" dirty="0" smtClean="0"/>
-              <a:t>Programming: New </a:t>
-            </a:r>
-            <a:r>
-              <a:rPr lang="en-US" altLang="en-US" sz="3600" b="1" u="sng" dirty="0" smtClean="0"/>
-              <a:t>SDN Programming Tools</a:t>
+              <a:t>Programming: New SDN Programming Tools</a:t>
             </a:r>
             <a:endParaRPr lang="en-US" altLang="en-US" sz="3600" b="1" i="1" u="sng" dirty="0"/>
           </a:p>
@@ -5099,15 +6274,7 @@
             </a:r>
             <a:r>
               <a:rPr lang="en-US" altLang="en-US" sz="1600" dirty="0" smtClean="0"/>
-              <a:t>(</a:t>
-            </a:r>
-            <a:r>
-              <a:rPr lang="en-US" altLang="en-US" sz="1600" dirty="0" smtClean="0"/>
-              <a:t>L2-L7) </a:t>
-            </a:r>
-            <a:r>
-              <a:rPr lang="en-US" altLang="en-US" sz="1600" dirty="0" smtClean="0"/>
-              <a:t>programming</a:t>
+              <a:t>(L2-L7) programming</a:t>
             </a:r>
             <a:endParaRPr lang="en-US" altLang="en-US" sz="1600" dirty="0"/>
           </a:p>
@@ -9013,11 +10180,7 @@
             </a:br>
             <a:r>
               <a:rPr lang="en-US" altLang="en-US" sz="3200" dirty="0" smtClean="0"/>
-              <a:t>- </a:t>
-            </a:r>
-            <a:r>
-              <a:rPr lang="en-US" altLang="en-US" sz="3200" dirty="0" smtClean="0"/>
-              <a:t>Change to Final Program</a:t>
+              <a:t>- Change to Final Program</a:t>
             </a:r>
             <a:br>
               <a:rPr lang="en-US" altLang="en-US" sz="3200" dirty="0" smtClean="0"/>
@@ -10506,7 +11669,47 @@
             </a:br>
             <a:r>
               <a:rPr lang="en-US" altLang="en-US" sz="3200" dirty="0" smtClean="0"/>
-              <a:t>Draw network, label what each component does</a:t>
+              <a:t>Draw network, label what each component does; show the overall workflow, including </a:t>
+            </a:r>
+          </a:p>
+          <a:p>
+            <a:pPr marL="514350" indent="-514350">
+              <a:buFont typeface="Arial" charset="0"/>
+              <a:buChar char="•"/>
+            </a:pPr>
+            <a:r>
+              <a:rPr lang="en-US" altLang="en-US" sz="3200" dirty="0" smtClean="0"/>
+              <a:t>IDE writes program</a:t>
+            </a:r>
+          </a:p>
+          <a:p>
+            <a:pPr marL="514350" indent="-514350">
+              <a:buFont typeface="Arial" charset="0"/>
+              <a:buChar char="•"/>
+            </a:pPr>
+            <a:r>
+              <a:rPr lang="en-US" altLang="en-US" sz="3200" dirty="0" smtClean="0"/>
+              <a:t>Bro to go beyond OF L2-4, to support L7</a:t>
+            </a:r>
+          </a:p>
+          <a:p>
+            <a:pPr marL="514350" indent="-514350">
+              <a:buFont typeface="Arial" charset="0"/>
+              <a:buChar char="•"/>
+            </a:pPr>
+            <a:r>
+              <a:rPr lang="en-US" altLang="en-US" sz="3200" dirty="0" smtClean="0"/>
+              <a:t>RESTCONF/YANG Data Store to achieve shared data</a:t>
+            </a:r>
+          </a:p>
+          <a:p>
+            <a:pPr marL="514350" indent="-514350">
+              <a:buFont typeface="Arial" charset="0"/>
+              <a:buChar char="•"/>
+            </a:pPr>
+            <a:r>
+              <a:rPr lang="mr-IN" altLang="en-US" sz="3200" smtClean="0"/>
+              <a:t>…</a:t>
             </a:r>
             <a:endParaRPr lang="en-US" altLang="en-US" sz="3200" dirty="0"/>
           </a:p>
@@ -10551,6 +11754,287 @@
       </p:grpSpPr>
       <p:sp>
         <p:nvSpPr>
+          <p:cNvPr id="39937" name="Title 2"/>
+          <p:cNvSpPr>
+            <a:spLocks noGrp="1"/>
+          </p:cNvSpPr>
+          <p:nvPr>
+            <p:ph type="title"/>
+          </p:nvPr>
+        </p:nvSpPr>
+        <p:spPr>
+          <a:xfrm>
+            <a:off x="1905000" y="561975"/>
+            <a:ext cx="8588375" cy="769938"/>
+          </a:xfrm>
+        </p:spPr>
+        <p:txBody>
+          <a:bodyPr/>
+          <a:lstStyle/>
+          <a:p>
+            <a:pPr algn="ctr"/>
+            <a:r>
+              <a:rPr lang="en-US" altLang="en-US" sz="2800" dirty="0" smtClean="0"/>
+              <a:t>Availability</a:t>
+            </a:r>
+            <a:endParaRPr lang="en-US" altLang="en-US" sz="2800" dirty="0"/>
+          </a:p>
+        </p:txBody>
+      </p:sp>
+      <p:sp>
+        <p:nvSpPr>
+          <p:cNvPr id="3" name="Title 2"/>
+          <p:cNvSpPr txBox="1">
+            <a:spLocks/>
+          </p:cNvSpPr>
+          <p:nvPr/>
+        </p:nvSpPr>
+        <p:spPr bwMode="auto">
+          <a:xfrm>
+            <a:off x="360218" y="2713398"/>
+            <a:ext cx="9157854" cy="1581511"/>
+          </a:xfrm>
+          <a:prstGeom prst="rect">
+            <a:avLst/>
+          </a:prstGeom>
+          <a:noFill/>
+          <a:ln>
+            <a:noFill/>
+          </a:ln>
+          <a:extLst>
+            <a:ext uri="{909E8E84-426E-40DD-AFC4-6F175D3DCCD1}">
+              <a14:hiddenFill xmlns:a14="http://schemas.microsoft.com/office/drawing/2010/main">
+                <a:solidFill>
+                  <a:srgbClr val="FFFFFF"/>
+                </a:solidFill>
+              </a14:hiddenFill>
+            </a:ext>
+            <a:ext uri="{91240B29-F687-4F45-9708-019B960494DF}">
+              <a14:hiddenLine xmlns:a14="http://schemas.microsoft.com/office/drawing/2010/main" w="9525">
+                <a:solidFill>
+                  <a:srgbClr val="000000"/>
+                </a:solidFill>
+                <a:miter lim="800000"/>
+                <a:headEnd/>
+                <a:tailEnd/>
+              </a14:hiddenLine>
+            </a:ext>
+            <a:ext uri="{FAA26D3D-D897-4be2-8F04-BA451C77F1D7}">
+              <ma14:placeholderFlag xmlns:ma14="http://schemas.microsoft.com/office/mac/drawingml/2011/main" val="1"/>
+            </a:ext>
+          </a:extLst>
+        </p:spPr>
+        <p:txBody>
+          <a:bodyPr vert="horz" wrap="square" lIns="91440" tIns="45720" rIns="91440" bIns="45720" numCol="1" anchor="ctr" anchorCtr="0" compatLnSpc="1">
+            <a:prstTxWarp prst="textNoShape">
+              <a:avLst/>
+            </a:prstTxWarp>
+          </a:bodyPr>
+          <a:lstStyle>
+            <a:lvl1pPr algn="l" rtl="0" eaLnBrk="0" fontAlgn="base" hangingPunct="0">
+              <a:lnSpc>
+                <a:spcPct val="90000"/>
+              </a:lnSpc>
+              <a:spcBef>
+                <a:spcPct val="0"/>
+              </a:spcBef>
+              <a:spcAft>
+                <a:spcPct val="0"/>
+              </a:spcAft>
+              <a:defRPr sz="4400" kern="1200">
+                <a:solidFill>
+                  <a:schemeClr val="tx1"/>
+                </a:solidFill>
+                <a:latin typeface="+mj-lt"/>
+                <a:ea typeface="+mj-ea"/>
+                <a:cs typeface="+mj-cs"/>
+              </a:defRPr>
+            </a:lvl1pPr>
+            <a:lvl2pPr algn="l" rtl="0" eaLnBrk="0" fontAlgn="base" hangingPunct="0">
+              <a:lnSpc>
+                <a:spcPct val="90000"/>
+              </a:lnSpc>
+              <a:spcBef>
+                <a:spcPct val="0"/>
+              </a:spcBef>
+              <a:spcAft>
+                <a:spcPct val="0"/>
+              </a:spcAft>
+              <a:defRPr sz="4400">
+                <a:solidFill>
+                  <a:schemeClr val="tx1"/>
+                </a:solidFill>
+                <a:latin typeface="Calibri Light" panose="020F0302020204030204" pitchFamily="34" charset="0"/>
+              </a:defRPr>
+            </a:lvl2pPr>
+            <a:lvl3pPr algn="l" rtl="0" eaLnBrk="0" fontAlgn="base" hangingPunct="0">
+              <a:lnSpc>
+                <a:spcPct val="90000"/>
+              </a:lnSpc>
+              <a:spcBef>
+                <a:spcPct val="0"/>
+              </a:spcBef>
+              <a:spcAft>
+                <a:spcPct val="0"/>
+              </a:spcAft>
+              <a:defRPr sz="4400">
+                <a:solidFill>
+                  <a:schemeClr val="tx1"/>
+                </a:solidFill>
+                <a:latin typeface="Calibri Light" panose="020F0302020204030204" pitchFamily="34" charset="0"/>
+              </a:defRPr>
+            </a:lvl3pPr>
+            <a:lvl4pPr algn="l" rtl="0" eaLnBrk="0" fontAlgn="base" hangingPunct="0">
+              <a:lnSpc>
+                <a:spcPct val="90000"/>
+              </a:lnSpc>
+              <a:spcBef>
+                <a:spcPct val="0"/>
+              </a:spcBef>
+              <a:spcAft>
+                <a:spcPct val="0"/>
+              </a:spcAft>
+              <a:defRPr sz="4400">
+                <a:solidFill>
+                  <a:schemeClr val="tx1"/>
+                </a:solidFill>
+                <a:latin typeface="Calibri Light" panose="020F0302020204030204" pitchFamily="34" charset="0"/>
+              </a:defRPr>
+            </a:lvl4pPr>
+            <a:lvl5pPr algn="l" rtl="0" eaLnBrk="0" fontAlgn="base" hangingPunct="0">
+              <a:lnSpc>
+                <a:spcPct val="90000"/>
+              </a:lnSpc>
+              <a:spcBef>
+                <a:spcPct val="0"/>
+              </a:spcBef>
+              <a:spcAft>
+                <a:spcPct val="0"/>
+              </a:spcAft>
+              <a:defRPr sz="4400">
+                <a:solidFill>
+                  <a:schemeClr val="tx1"/>
+                </a:solidFill>
+                <a:latin typeface="Calibri Light" panose="020F0302020204030204" pitchFamily="34" charset="0"/>
+              </a:defRPr>
+            </a:lvl5pPr>
+            <a:lvl6pPr marL="457200" algn="l" rtl="0" fontAlgn="base">
+              <a:lnSpc>
+                <a:spcPct val="90000"/>
+              </a:lnSpc>
+              <a:spcBef>
+                <a:spcPct val="0"/>
+              </a:spcBef>
+              <a:spcAft>
+                <a:spcPct val="0"/>
+              </a:spcAft>
+              <a:defRPr sz="4400">
+                <a:solidFill>
+                  <a:schemeClr val="tx1"/>
+                </a:solidFill>
+                <a:latin typeface="Calibri Light" panose="020F0302020204030204" pitchFamily="34" charset="0"/>
+              </a:defRPr>
+            </a:lvl6pPr>
+            <a:lvl7pPr marL="914400" algn="l" rtl="0" fontAlgn="base">
+              <a:lnSpc>
+                <a:spcPct val="90000"/>
+              </a:lnSpc>
+              <a:spcBef>
+                <a:spcPct val="0"/>
+              </a:spcBef>
+              <a:spcAft>
+                <a:spcPct val="0"/>
+              </a:spcAft>
+              <a:defRPr sz="4400">
+                <a:solidFill>
+                  <a:schemeClr val="tx1"/>
+                </a:solidFill>
+                <a:latin typeface="Calibri Light" panose="020F0302020204030204" pitchFamily="34" charset="0"/>
+              </a:defRPr>
+            </a:lvl7pPr>
+            <a:lvl8pPr marL="1371600" algn="l" rtl="0" fontAlgn="base">
+              <a:lnSpc>
+                <a:spcPct val="90000"/>
+              </a:lnSpc>
+              <a:spcBef>
+                <a:spcPct val="0"/>
+              </a:spcBef>
+              <a:spcAft>
+                <a:spcPct val="0"/>
+              </a:spcAft>
+              <a:defRPr sz="4400">
+                <a:solidFill>
+                  <a:schemeClr val="tx1"/>
+                </a:solidFill>
+                <a:latin typeface="Calibri Light" panose="020F0302020204030204" pitchFamily="34" charset="0"/>
+              </a:defRPr>
+            </a:lvl8pPr>
+            <a:lvl9pPr marL="1828800" algn="l" rtl="0" fontAlgn="base">
+              <a:lnSpc>
+                <a:spcPct val="90000"/>
+              </a:lnSpc>
+              <a:spcBef>
+                <a:spcPct val="0"/>
+              </a:spcBef>
+              <a:spcAft>
+                <a:spcPct val="0"/>
+              </a:spcAft>
+              <a:defRPr sz="4400">
+                <a:solidFill>
+                  <a:schemeClr val="tx1"/>
+                </a:solidFill>
+                <a:latin typeface="Calibri Light" panose="020F0302020204030204" pitchFamily="34" charset="0"/>
+              </a:defRPr>
+            </a:lvl9pPr>
+          </a:lstStyle>
+          <a:p>
+            <a:r>
+              <a:rPr lang="en-US" altLang="en-US" sz="3200" dirty="0" smtClean="0"/>
+              <a:t>Make it clear how others may try our system</a:t>
+            </a:r>
+            <a:endParaRPr lang="en-US" altLang="en-US" sz="3200" dirty="0"/>
+          </a:p>
+        </p:txBody>
+      </p:sp>
+    </p:spTree>
+    <p:extLst>
+      <p:ext uri="{BB962C8B-B14F-4D97-AF65-F5344CB8AC3E}">
+        <p14:creationId xmlns:p14="http://schemas.microsoft.com/office/powerpoint/2010/main" val="291771267"/>
+      </p:ext>
+    </p:extLst>
+  </p:cSld>
+  <p:clrMapOvr>
+    <a:masterClrMapping/>
+  </p:clrMapOvr>
+  <p:timing>
+    <p:tnLst>
+      <p:par>
+        <p:cTn id="1" dur="indefinite" restart="never" nodeType="tmRoot"/>
+      </p:par>
+    </p:tnLst>
+  </p:timing>
+</p:sld>
+</file>
+
+<file path=ppt/slides/slide7.xml><?xml version="1.0" encoding="utf-8"?>
+<p:sld xmlns:a="http://schemas.openxmlformats.org/drawingml/2006/main" xmlns:r="http://schemas.openxmlformats.org/officeDocument/2006/relationships" xmlns:p="http://schemas.openxmlformats.org/presentationml/2006/main">
+  <p:cSld>
+    <p:spTree>
+      <p:nvGrpSpPr>
+        <p:cNvPr id="1" name=""/>
+        <p:cNvGrpSpPr/>
+        <p:nvPr/>
+      </p:nvGrpSpPr>
+      <p:grpSpPr>
+        <a:xfrm>
+          <a:off x="0" y="0"/>
+          <a:ext cx="0" cy="0"/>
+          <a:chOff x="0" y="0"/>
+          <a:chExt cx="0" cy="0"/>
+        </a:xfrm>
+      </p:grpSpPr>
+      <p:sp>
+        <p:nvSpPr>
           <p:cNvPr id="2" name="Title 1"/>
           <p:cNvSpPr>
             <a:spLocks noGrp="1"/>
@@ -10611,7 +12095,7 @@
 </p:sld>
 </file>
 
-<file path=ppt/slides/slide7.xml><?xml version="1.0" encoding="utf-8"?>
+<file path=ppt/slides/slide8.xml><?xml version="1.0" encoding="utf-8"?>
 <p:sld xmlns:a="http://schemas.openxmlformats.org/drawingml/2006/main" xmlns:r="http://schemas.openxmlformats.org/officeDocument/2006/relationships" xmlns:p="http://schemas.openxmlformats.org/presentationml/2006/main">
   <p:cSld>
     <p:spTree>
@@ -12053,7 +13537,7 @@
 </p:sld>
 </file>
 
-<file path=ppt/slides/slide8.xml><?xml version="1.0" encoding="utf-8"?>
+<file path=ppt/slides/slide9.xml><?xml version="1.0" encoding="utf-8"?>
 <p:sld xmlns:a="http://schemas.openxmlformats.org/drawingml/2006/main" xmlns:r="http://schemas.openxmlformats.org/officeDocument/2006/relationships" xmlns:p="http://schemas.openxmlformats.org/presentationml/2006/main">
   <p:cSld>
     <p:spTree>
@@ -15994,1184 +17478,6 @@
         </p:txBody>
       </p:sp>
     </p:spTree>
-  </p:cSld>
-  <p:clrMapOvr>
-    <a:masterClrMapping/>
-  </p:clrMapOvr>
-  <p:timing>
-    <p:tnLst>
-      <p:par>
-        <p:cTn id="1" dur="indefinite" restart="never" nodeType="tmRoot"/>
-      </p:par>
-    </p:tnLst>
-  </p:timing>
-</p:sld>
-</file>
-
-<file path=ppt/slides/slide9.xml><?xml version="1.0" encoding="utf-8"?>
-<p:sld xmlns:a="http://schemas.openxmlformats.org/drawingml/2006/main" xmlns:r="http://schemas.openxmlformats.org/officeDocument/2006/relationships" xmlns:p="http://schemas.openxmlformats.org/presentationml/2006/main">
-  <p:cSld>
-    <p:spTree>
-      <p:nvGrpSpPr>
-        <p:cNvPr id="1" name=""/>
-        <p:cNvGrpSpPr/>
-        <p:nvPr/>
-      </p:nvGrpSpPr>
-      <p:grpSpPr>
-        <a:xfrm>
-          <a:off x="0" y="0"/>
-          <a:ext cx="0" cy="0"/>
-          <a:chOff x="0" y="0"/>
-          <a:chExt cx="0" cy="0"/>
-        </a:xfrm>
-      </p:grpSpPr>
-      <p:sp>
-        <p:nvSpPr>
-          <p:cNvPr id="43009" name="Title 2"/>
-          <p:cNvSpPr>
-            <a:spLocks noGrp="1"/>
-          </p:cNvSpPr>
-          <p:nvPr>
-            <p:ph type="title"/>
-          </p:nvPr>
-        </p:nvSpPr>
-        <p:spPr>
-          <a:xfrm>
-            <a:off x="838200" y="365125"/>
-            <a:ext cx="10515600" cy="798657"/>
-          </a:xfrm>
-        </p:spPr>
-        <p:txBody>
-          <a:bodyPr/>
-          <a:lstStyle/>
-          <a:p>
-            <a:pPr algn="ctr"/>
-            <a:r>
-              <a:rPr lang="en-US" altLang="en-US" sz="2800" dirty="0" smtClean="0"/>
-              <a:t>Problem</a:t>
-            </a:r>
-            <a:endParaRPr lang="en-US" altLang="en-US" sz="2800" dirty="0"/>
-          </a:p>
-        </p:txBody>
-      </p:sp>
-      <p:sp>
-        <p:nvSpPr>
-          <p:cNvPr id="3" name="Content Placeholder 2"/>
-          <p:cNvSpPr>
-            <a:spLocks noGrp="1"/>
-          </p:cNvSpPr>
-          <p:nvPr>
-            <p:ph idx="1"/>
-          </p:nvPr>
-        </p:nvSpPr>
-        <p:spPr>
-          <a:xfrm>
-            <a:off x="838199" y="1052945"/>
-            <a:ext cx="11242965" cy="5124018"/>
-          </a:xfrm>
-        </p:spPr>
-        <p:txBody>
-          <a:bodyPr/>
-          <a:lstStyle/>
-          <a:p>
-            <a:r>
-              <a:rPr lang="en-US" sz="2400" dirty="0" smtClean="0"/>
-              <a:t>Super computing can benefit from super efficient and super flexible infrastructures</a:t>
-            </a:r>
-          </a:p>
-          <a:p>
-            <a:r>
-              <a:rPr lang="en-US" sz="2400" dirty="0" smtClean="0"/>
-              <a:t>Traditional networks are not flexible and often cannot use network resources efficiently</a:t>
-            </a:r>
-          </a:p>
-          <a:p>
-            <a:r>
-              <a:rPr lang="en-US" sz="2400" dirty="0" smtClean="0"/>
-              <a:t>Emergence of SDN promises super efficient and flexible networks but current SDN control programming systems are low level, limited in key capabilities</a:t>
-            </a:r>
-          </a:p>
-        </p:txBody>
-      </p:sp>
-      <p:sp>
-        <p:nvSpPr>
-          <p:cNvPr id="5" name="Rectangle 4"/>
-          <p:cNvSpPr/>
-          <p:nvPr/>
-        </p:nvSpPr>
-        <p:spPr bwMode="auto">
-          <a:xfrm>
-            <a:off x="1594749" y="3473460"/>
-            <a:ext cx="8307295" cy="1740812"/>
-          </a:xfrm>
-          <a:prstGeom prst="rect">
-            <a:avLst/>
-          </a:prstGeom>
-          <a:solidFill>
-            <a:srgbClr val="4F81BD"/>
-          </a:solidFill>
-          <a:ln w="9525" cap="flat" cmpd="sng" algn="ctr">
-            <a:solidFill>
-              <a:sysClr val="windowText" lastClr="000000"/>
-            </a:solidFill>
-            <a:prstDash val="solid"/>
-            <a:round/>
-            <a:headEnd type="none" w="med" len="med"/>
-            <a:tailEnd type="none" w="med" len="med"/>
-          </a:ln>
-          <a:effectLst/>
-        </p:spPr>
-        <p:txBody>
-          <a:bodyPr vert="horz" wrap="square" lIns="91440" tIns="45720" rIns="91440" bIns="45720" numCol="1" rtlCol="0" anchor="t" anchorCtr="0" compatLnSpc="1">
-            <a:prstTxWarp prst="textNoShape">
-              <a:avLst/>
-            </a:prstTxWarp>
-          </a:bodyPr>
-          <a:lstStyle/>
-          <a:p>
-            <a:pPr marL="0" marR="0" lvl="0" indent="0" algn="l" defTabSz="914400" rtl="0" eaLnBrk="0" fontAlgn="base" latinLnBrk="0" hangingPunct="0">
-              <a:lnSpc>
-                <a:spcPct val="100000"/>
-              </a:lnSpc>
-              <a:spcBef>
-                <a:spcPct val="0"/>
-              </a:spcBef>
-              <a:spcAft>
-                <a:spcPct val="0"/>
-              </a:spcAft>
-              <a:buClrTx/>
-              <a:buSzTx/>
-              <a:buFontTx/>
-              <a:buNone/>
-              <a:tabLst/>
-              <a:defRPr/>
-            </a:pPr>
-            <a:endParaRPr kumimoji="0" lang="en-US" sz="2400" b="0" i="0" u="none" strike="noStrike" kern="0" cap="none" spc="0" normalizeH="0" baseline="-25000" noProof="0">
-              <a:ln>
-                <a:noFill/>
-              </a:ln>
-              <a:solidFill>
-                <a:sysClr val="windowText" lastClr="000000"/>
-              </a:solidFill>
-              <a:effectLst>
-                <a:outerShdw blurRad="38100" dist="38100" dir="2700000" algn="tl">
-                  <a:srgbClr val="000000">
-                    <a:alpha val="43137"/>
-                  </a:srgbClr>
-                </a:outerShdw>
-              </a:effectLst>
-              <a:uLnTx/>
-              <a:uFillTx/>
-              <a:latin typeface="Arial" pitchFamily="-105" charset="0"/>
-              <a:ea typeface="ＭＳ Ｐゴシック" pitchFamily="-105" charset="-128"/>
-              <a:cs typeface="ＭＳ Ｐゴシック" pitchFamily="-105" charset="-128"/>
-            </a:endParaRPr>
-          </a:p>
-        </p:txBody>
-      </p:sp>
-      <p:sp>
-        <p:nvSpPr>
-          <p:cNvPr id="6" name="Rectangle 5"/>
-          <p:cNvSpPr/>
-          <p:nvPr/>
-        </p:nvSpPr>
-        <p:spPr>
-          <a:xfrm>
-            <a:off x="1832127" y="4407953"/>
-            <a:ext cx="1374589" cy="660046"/>
-          </a:xfrm>
-          <a:prstGeom prst="rect">
-            <a:avLst/>
-          </a:prstGeom>
-          <a:gradFill rotWithShape="1">
-            <a:gsLst>
-              <a:gs pos="0">
-                <a:srgbClr val="9E9273">
-                  <a:tint val="100000"/>
-                  <a:shade val="100000"/>
-                  <a:satMod val="130000"/>
-                </a:srgbClr>
-              </a:gs>
-              <a:gs pos="100000">
-                <a:srgbClr val="9E9273">
-                  <a:tint val="50000"/>
-                  <a:shade val="100000"/>
-                  <a:satMod val="350000"/>
-                </a:srgbClr>
-              </a:gs>
-            </a:gsLst>
-            <a:lin ang="16200000" scaled="0"/>
-          </a:gradFill>
-          <a:ln>
-            <a:noFill/>
-          </a:ln>
-          <a:effectLst>
-            <a:outerShdw blurRad="40000" dist="23000" dir="5400000" rotWithShape="0">
-              <a:srgbClr val="000000">
-                <a:alpha val="35000"/>
-              </a:srgbClr>
-            </a:outerShdw>
-          </a:effectLst>
-          <a:scene3d>
-            <a:camera prst="orthographicFront">
-              <a:rot lat="0" lon="0" rev="0"/>
-            </a:camera>
-            <a:lightRig rig="threePt" dir="t">
-              <a:rot lat="0" lon="0" rev="1200000"/>
-            </a:lightRig>
-          </a:scene3d>
-          <a:sp3d>
-            <a:bevelT w="63500" h="25400"/>
-          </a:sp3d>
-        </p:spPr>
-        <p:txBody>
-          <a:bodyPr tIns="18288" rtlCol="0" anchor="ctr"/>
-          <a:lstStyle/>
-          <a:p>
-            <a:pPr algn="ctr" eaLnBrk="1" fontAlgn="auto" hangingPunct="1">
-              <a:spcBef>
-                <a:spcPts val="0"/>
-              </a:spcBef>
-              <a:spcAft>
-                <a:spcPts val="0"/>
-              </a:spcAft>
-            </a:pPr>
-            <a:r>
-              <a:rPr lang="en-US" baseline="0" noProof="0" dirty="0" smtClean="0">
-                <a:solidFill>
-                  <a:srgbClr val="000090"/>
-                </a:solidFill>
-                <a:latin typeface="Arial" pitchFamily="-105" charset="0"/>
-                <a:ea typeface="ＭＳ Ｐゴシック" pitchFamily="-105" charset="-128"/>
-                <a:cs typeface="ＭＳ Ｐゴシック" pitchFamily="-105" charset="-128"/>
-              </a:rPr>
-              <a:t>Network</a:t>
-            </a:r>
-            <a:br>
-              <a:rPr lang="en-US" baseline="0" noProof="0" dirty="0" smtClean="0">
-                <a:solidFill>
-                  <a:srgbClr val="000090"/>
-                </a:solidFill>
-                <a:latin typeface="Arial" pitchFamily="-105" charset="0"/>
-                <a:ea typeface="ＭＳ Ｐゴシック" pitchFamily="-105" charset="-128"/>
-                <a:cs typeface="ＭＳ Ｐゴシック" pitchFamily="-105" charset="-128"/>
-              </a:rPr>
-            </a:br>
-            <a:r>
-              <a:rPr lang="en-US" baseline="0" noProof="0" dirty="0" smtClean="0">
-                <a:solidFill>
-                  <a:srgbClr val="000090"/>
-                </a:solidFill>
-                <a:latin typeface="Arial" pitchFamily="-105" charset="0"/>
-                <a:ea typeface="ＭＳ Ｐゴシック" pitchFamily="-105" charset="-128"/>
-                <a:cs typeface="ＭＳ Ｐゴシック" pitchFamily="-105" charset="-128"/>
-              </a:rPr>
-              <a:t>State</a:t>
-            </a:r>
-            <a:endParaRPr kumimoji="0" lang="en-US" i="0" u="none" strike="noStrike" kern="0" cap="none" spc="0" normalizeH="0" baseline="0" noProof="0" dirty="0">
-              <a:ln>
-                <a:noFill/>
-              </a:ln>
-              <a:solidFill>
-                <a:srgbClr val="000090"/>
-              </a:solidFill>
-              <a:effectLst/>
-              <a:uLnTx/>
-              <a:uFillTx/>
-              <a:latin typeface="Calibri"/>
-              <a:ea typeface="+mn-ea"/>
-              <a:cs typeface="+mn-cs"/>
-            </a:endParaRPr>
-          </a:p>
-        </p:txBody>
-      </p:sp>
-      <p:sp>
-        <p:nvSpPr>
-          <p:cNvPr id="7" name="Rectangle 6"/>
-          <p:cNvSpPr/>
-          <p:nvPr/>
-        </p:nvSpPr>
-        <p:spPr>
-          <a:xfrm>
-            <a:off x="6928752" y="3987725"/>
-            <a:ext cx="1165411" cy="808144"/>
-          </a:xfrm>
-          <a:prstGeom prst="rect">
-            <a:avLst/>
-          </a:prstGeom>
-          <a:gradFill rotWithShape="1">
-            <a:gsLst>
-              <a:gs pos="0">
-                <a:srgbClr val="9E9273">
-                  <a:tint val="100000"/>
-                  <a:shade val="100000"/>
-                  <a:satMod val="130000"/>
-                </a:srgbClr>
-              </a:gs>
-              <a:gs pos="100000">
-                <a:srgbClr val="9E9273">
-                  <a:tint val="50000"/>
-                  <a:shade val="100000"/>
-                  <a:satMod val="350000"/>
-                </a:srgbClr>
-              </a:gs>
-            </a:gsLst>
-            <a:lin ang="16200000" scaled="0"/>
-          </a:gradFill>
-          <a:ln>
-            <a:noFill/>
-          </a:ln>
-          <a:effectLst>
-            <a:outerShdw blurRad="40000" dist="23000" dir="5400000" rotWithShape="0">
-              <a:srgbClr val="000000">
-                <a:alpha val="35000"/>
-              </a:srgbClr>
-            </a:outerShdw>
-          </a:effectLst>
-          <a:scene3d>
-            <a:camera prst="orthographicFront">
-              <a:rot lat="0" lon="0" rev="0"/>
-            </a:camera>
-            <a:lightRig rig="threePt" dir="t">
-              <a:rot lat="0" lon="0" rev="1200000"/>
-            </a:lightRig>
-          </a:scene3d>
-          <a:sp3d>
-            <a:bevelT w="63500" h="25400"/>
-          </a:sp3d>
-        </p:spPr>
-        <p:txBody>
-          <a:bodyPr tIns="18288" rtlCol="0" anchor="ctr"/>
-          <a:lstStyle/>
-          <a:p>
-            <a:pPr algn="ctr" eaLnBrk="1" fontAlgn="auto" hangingPunct="1">
-              <a:spcBef>
-                <a:spcPts val="0"/>
-              </a:spcBef>
-              <a:spcAft>
-                <a:spcPts val="0"/>
-              </a:spcAft>
-            </a:pPr>
-            <a:r>
-              <a:rPr lang="en-US" altLang="zh-CN" sz="1800" baseline="0" dirty="0" err="1" smtClean="0">
-                <a:solidFill>
-                  <a:srgbClr val="000090"/>
-                </a:solidFill>
-                <a:latin typeface="Arial" pitchFamily="-105" charset="0"/>
-                <a:ea typeface="ＭＳ Ｐゴシック" pitchFamily="-105" charset="-128"/>
-                <a:cs typeface="ＭＳ Ｐゴシック" pitchFamily="-105" charset="-128"/>
-              </a:rPr>
-              <a:t>Datapath</a:t>
-            </a:r>
-            <a:r>
-              <a:rPr lang="en-US" altLang="zh-CN" sz="1800" baseline="0" dirty="0" smtClean="0">
-                <a:solidFill>
-                  <a:srgbClr val="000090"/>
-                </a:solidFill>
-                <a:latin typeface="Arial" pitchFamily="-105" charset="0"/>
-                <a:ea typeface="ＭＳ Ｐゴシック" pitchFamily="-105" charset="-128"/>
-                <a:cs typeface="ＭＳ Ｐゴシック" pitchFamily="-105" charset="-128"/>
-              </a:rPr>
-              <a:t/>
-            </a:r>
-            <a:br>
-              <a:rPr lang="en-US" altLang="zh-CN" sz="1800" baseline="0" dirty="0" smtClean="0">
-                <a:solidFill>
-                  <a:srgbClr val="000090"/>
-                </a:solidFill>
-                <a:latin typeface="Arial" pitchFamily="-105" charset="0"/>
-                <a:ea typeface="ＭＳ Ｐゴシック" pitchFamily="-105" charset="-128"/>
-                <a:cs typeface="ＭＳ Ｐゴシック" pitchFamily="-105" charset="-128"/>
-              </a:rPr>
-            </a:br>
-            <a:r>
-              <a:rPr lang="en-US" altLang="zh-CN" sz="1800" baseline="0" dirty="0" smtClean="0">
-                <a:solidFill>
-                  <a:srgbClr val="000090"/>
-                </a:solidFill>
-                <a:latin typeface="Arial" pitchFamily="-105" charset="0"/>
-                <a:ea typeface="ＭＳ Ｐゴシック" pitchFamily="-105" charset="-128"/>
-                <a:cs typeface="ＭＳ Ｐゴシック" pitchFamily="-105" charset="-128"/>
-              </a:rPr>
-              <a:t>Model</a:t>
-            </a:r>
-            <a:endParaRPr kumimoji="0" lang="en-US" sz="1800" i="0" u="none" strike="noStrike" kern="0" cap="none" spc="0" normalizeH="0" baseline="0" noProof="0" dirty="0">
-              <a:ln>
-                <a:noFill/>
-              </a:ln>
-              <a:solidFill>
-                <a:srgbClr val="000090"/>
-              </a:solidFill>
-              <a:effectLst/>
-              <a:uLnTx/>
-              <a:uFillTx/>
-              <a:latin typeface="Calibri"/>
-              <a:ea typeface="+mn-ea"/>
-              <a:cs typeface="+mn-cs"/>
-            </a:endParaRPr>
-          </a:p>
-        </p:txBody>
-      </p:sp>
-      <p:sp>
-        <p:nvSpPr>
-          <p:cNvPr id="8" name="Rectangle 7"/>
-          <p:cNvSpPr/>
-          <p:nvPr/>
-        </p:nvSpPr>
-        <p:spPr>
-          <a:xfrm>
-            <a:off x="1811738" y="3604092"/>
-            <a:ext cx="1401733" cy="648794"/>
-          </a:xfrm>
-          <a:prstGeom prst="rect">
-            <a:avLst/>
-          </a:prstGeom>
-          <a:gradFill rotWithShape="1">
-            <a:gsLst>
-              <a:gs pos="0">
-                <a:srgbClr val="9E9273">
-                  <a:tint val="100000"/>
-                  <a:shade val="100000"/>
-                  <a:satMod val="130000"/>
-                </a:srgbClr>
-              </a:gs>
-              <a:gs pos="100000">
-                <a:srgbClr val="9E9273">
-                  <a:tint val="50000"/>
-                  <a:shade val="100000"/>
-                  <a:satMod val="350000"/>
-                </a:srgbClr>
-              </a:gs>
-            </a:gsLst>
-            <a:lin ang="16200000" scaled="0"/>
-          </a:gradFill>
-          <a:ln>
-            <a:noFill/>
-          </a:ln>
-          <a:effectLst>
-            <a:outerShdw blurRad="40000" dist="23000" dir="5400000" rotWithShape="0">
-              <a:srgbClr val="000000">
-                <a:alpha val="35000"/>
-              </a:srgbClr>
-            </a:outerShdw>
-          </a:effectLst>
-          <a:scene3d>
-            <a:camera prst="orthographicFront">
-              <a:rot lat="0" lon="0" rev="0"/>
-            </a:camera>
-            <a:lightRig rig="threePt" dir="t">
-              <a:rot lat="0" lon="0" rev="1200000"/>
-            </a:lightRig>
-          </a:scene3d>
-          <a:sp3d>
-            <a:bevelT w="63500" h="25400"/>
-          </a:sp3d>
-        </p:spPr>
-        <p:txBody>
-          <a:bodyPr tIns="18288" rtlCol="0" anchor="ctr"/>
-          <a:lstStyle/>
-          <a:p>
-            <a:pPr algn="ctr" eaLnBrk="1" fontAlgn="auto" hangingPunct="1">
-              <a:spcBef>
-                <a:spcPts val="0"/>
-              </a:spcBef>
-              <a:spcAft>
-                <a:spcPts val="0"/>
-              </a:spcAft>
-            </a:pPr>
-            <a:r>
-              <a:rPr lang="en-US" baseline="0" noProof="0" dirty="0" smtClean="0">
-                <a:solidFill>
-                  <a:srgbClr val="000090"/>
-                </a:solidFill>
-                <a:latin typeface="Arial" pitchFamily="-105" charset="0"/>
-                <a:ea typeface="ＭＳ Ｐゴシック" pitchFamily="-105" charset="-128"/>
-                <a:cs typeface="ＭＳ Ｐゴシック" pitchFamily="-105" charset="-128"/>
-              </a:rPr>
-              <a:t>Service</a:t>
-            </a:r>
-            <a:r>
-              <a:rPr lang="en-US" baseline="0" dirty="0">
-                <a:solidFill>
-                  <a:srgbClr val="000090"/>
-                </a:solidFill>
-                <a:latin typeface="Arial" pitchFamily="-105" charset="0"/>
-                <a:ea typeface="ＭＳ Ｐゴシック" pitchFamily="-105" charset="-128"/>
-                <a:cs typeface="ＭＳ Ｐゴシック" pitchFamily="-105" charset="-128"/>
-              </a:rPr>
-              <a:t>/</a:t>
-            </a:r>
-            <a:r>
-              <a:rPr lang="en-US" baseline="0" noProof="0" dirty="0" smtClean="0">
-                <a:solidFill>
-                  <a:srgbClr val="000090"/>
-                </a:solidFill>
-                <a:latin typeface="Arial" pitchFamily="-105" charset="0"/>
-                <a:ea typeface="ＭＳ Ｐゴシック" pitchFamily="-105" charset="-128"/>
-                <a:cs typeface="ＭＳ Ｐゴシック" pitchFamily="-105" charset="-128"/>
-              </a:rPr>
-              <a:t/>
-            </a:r>
-            <a:br>
-              <a:rPr lang="en-US" baseline="0" noProof="0" dirty="0" smtClean="0">
-                <a:solidFill>
-                  <a:srgbClr val="000090"/>
-                </a:solidFill>
-                <a:latin typeface="Arial" pitchFamily="-105" charset="0"/>
-                <a:ea typeface="ＭＳ Ｐゴシック" pitchFamily="-105" charset="-128"/>
-                <a:cs typeface="ＭＳ Ｐゴシック" pitchFamily="-105" charset="-128"/>
-              </a:rPr>
-            </a:br>
-            <a:r>
-              <a:rPr lang="en-US" baseline="0" noProof="0" dirty="0" smtClean="0">
-                <a:solidFill>
-                  <a:srgbClr val="000090"/>
-                </a:solidFill>
-                <a:latin typeface="Arial" pitchFamily="-105" charset="0"/>
-                <a:ea typeface="ＭＳ Ｐゴシック" pitchFamily="-105" charset="-128"/>
-                <a:cs typeface="ＭＳ Ｐゴシック" pitchFamily="-105" charset="-128"/>
-              </a:rPr>
-              <a:t>Policy</a:t>
-            </a:r>
-            <a:endParaRPr kumimoji="0" lang="en-US" i="0" u="none" strike="noStrike" kern="0" cap="none" spc="0" normalizeH="0" baseline="0" noProof="0" dirty="0">
-              <a:ln>
-                <a:noFill/>
-              </a:ln>
-              <a:solidFill>
-                <a:srgbClr val="000090"/>
-              </a:solidFill>
-              <a:effectLst/>
-              <a:uLnTx/>
-              <a:uFillTx/>
-              <a:latin typeface="Calibri"/>
-              <a:ea typeface="+mn-ea"/>
-              <a:cs typeface="+mn-cs"/>
-            </a:endParaRPr>
-          </a:p>
-        </p:txBody>
-      </p:sp>
-      <p:sp>
-        <p:nvSpPr>
-          <p:cNvPr id="9" name="Rectangle 8"/>
-          <p:cNvSpPr/>
-          <p:nvPr/>
-        </p:nvSpPr>
-        <p:spPr bwMode="auto">
-          <a:xfrm>
-            <a:off x="6749456" y="3708352"/>
-            <a:ext cx="2913529" cy="1359647"/>
-          </a:xfrm>
-          <a:prstGeom prst="rect">
-            <a:avLst/>
-          </a:prstGeom>
-          <a:noFill/>
-          <a:ln w="3175" cap="flat" cmpd="sng" algn="ctr">
-            <a:solidFill>
-              <a:srgbClr val="F79646">
-                <a:lumMod val="50000"/>
-              </a:srgbClr>
-            </a:solidFill>
-            <a:prstDash val="dash"/>
-            <a:round/>
-            <a:headEnd type="none" w="med" len="med"/>
-            <a:tailEnd type="none" w="med" len="med"/>
-          </a:ln>
-          <a:effectLst/>
-        </p:spPr>
-        <p:txBody>
-          <a:bodyPr vert="horz" wrap="square" lIns="91440" tIns="45720" rIns="91440" bIns="45720" numCol="1" rtlCol="0" anchor="t" anchorCtr="0" compatLnSpc="1">
-            <a:prstTxWarp prst="textNoShape">
-              <a:avLst/>
-            </a:prstTxWarp>
-          </a:bodyPr>
-          <a:lstStyle/>
-          <a:p>
-            <a:pPr marL="0" marR="0" lvl="0" indent="0" algn="l" defTabSz="914400" rtl="0" eaLnBrk="0" fontAlgn="base" latinLnBrk="0" hangingPunct="0">
-              <a:lnSpc>
-                <a:spcPct val="100000"/>
-              </a:lnSpc>
-              <a:spcBef>
-                <a:spcPct val="0"/>
-              </a:spcBef>
-              <a:spcAft>
-                <a:spcPct val="0"/>
-              </a:spcAft>
-              <a:buClrTx/>
-              <a:buSzTx/>
-              <a:buFontTx/>
-              <a:buNone/>
-              <a:tabLst/>
-              <a:defRPr/>
-            </a:pPr>
-            <a:endParaRPr kumimoji="0" lang="en-US" sz="2400" b="0" i="0" u="none" strike="noStrike" kern="0" cap="none" spc="0" normalizeH="0" baseline="-25000" noProof="0">
-              <a:ln>
-                <a:noFill/>
-              </a:ln>
-              <a:solidFill>
-                <a:sysClr val="windowText" lastClr="000000"/>
-              </a:solidFill>
-              <a:effectLst>
-                <a:outerShdw blurRad="38100" dist="38100" dir="2700000" algn="tl">
-                  <a:srgbClr val="000000">
-                    <a:alpha val="43137"/>
-                  </a:srgbClr>
-                </a:outerShdw>
-              </a:effectLst>
-              <a:uLnTx/>
-              <a:uFillTx/>
-              <a:latin typeface="Arial" pitchFamily="-105" charset="0"/>
-              <a:ea typeface="ＭＳ Ｐゴシック" pitchFamily="-105" charset="-128"/>
-              <a:cs typeface="ＭＳ Ｐゴシック" pitchFamily="-105" charset="-128"/>
-            </a:endParaRPr>
-          </a:p>
-        </p:txBody>
-      </p:sp>
-      <p:sp>
-        <p:nvSpPr>
-          <p:cNvPr id="10" name="Rectangle 9"/>
-          <p:cNvSpPr/>
-          <p:nvPr/>
-        </p:nvSpPr>
-        <p:spPr>
-          <a:xfrm>
-            <a:off x="8321270" y="3990713"/>
-            <a:ext cx="1165411" cy="808144"/>
-          </a:xfrm>
-          <a:prstGeom prst="rect">
-            <a:avLst/>
-          </a:prstGeom>
-          <a:gradFill rotWithShape="1">
-            <a:gsLst>
-              <a:gs pos="0">
-                <a:srgbClr val="9E9273">
-                  <a:tint val="100000"/>
-                  <a:shade val="100000"/>
-                  <a:satMod val="130000"/>
-                </a:srgbClr>
-              </a:gs>
-              <a:gs pos="100000">
-                <a:srgbClr val="9E9273">
-                  <a:tint val="50000"/>
-                  <a:shade val="100000"/>
-                  <a:satMod val="350000"/>
-                </a:srgbClr>
-              </a:gs>
-            </a:gsLst>
-            <a:lin ang="16200000" scaled="0"/>
-          </a:gradFill>
-          <a:ln>
-            <a:noFill/>
-          </a:ln>
-          <a:effectLst>
-            <a:outerShdw blurRad="40000" dist="23000" dir="5400000" rotWithShape="0">
-              <a:srgbClr val="000000">
-                <a:alpha val="35000"/>
-              </a:srgbClr>
-            </a:outerShdw>
-          </a:effectLst>
-          <a:scene3d>
-            <a:camera prst="orthographicFront">
-              <a:rot lat="0" lon="0" rev="0"/>
-            </a:camera>
-            <a:lightRig rig="threePt" dir="t">
-              <a:rot lat="0" lon="0" rev="1200000"/>
-            </a:lightRig>
-          </a:scene3d>
-          <a:sp3d>
-            <a:bevelT w="63500" h="25400"/>
-          </a:sp3d>
-        </p:spPr>
-        <p:txBody>
-          <a:bodyPr tIns="18288" rtlCol="0" anchor="ctr"/>
-          <a:lstStyle/>
-          <a:p>
-            <a:pPr algn="ctr" eaLnBrk="1" fontAlgn="auto" hangingPunct="1">
-              <a:spcBef>
-                <a:spcPts val="0"/>
-              </a:spcBef>
-              <a:spcAft>
-                <a:spcPts val="0"/>
-              </a:spcAft>
-            </a:pPr>
-            <a:r>
-              <a:rPr lang="en-US" altLang="zh-CN" sz="1800" baseline="0" dirty="0" err="1" smtClean="0">
-                <a:solidFill>
-                  <a:srgbClr val="000090"/>
-                </a:solidFill>
-                <a:latin typeface="Arial" pitchFamily="-105" charset="0"/>
-                <a:ea typeface="ＭＳ Ｐゴシック" pitchFamily="-105" charset="-128"/>
-                <a:cs typeface="ＭＳ Ｐゴシック" pitchFamily="-105" charset="-128"/>
-              </a:rPr>
-              <a:t>Datapath</a:t>
-            </a:r>
-            <a:r>
-              <a:rPr lang="en-US" altLang="zh-CN" sz="1800" baseline="0" dirty="0" smtClean="0">
-                <a:solidFill>
-                  <a:srgbClr val="000090"/>
-                </a:solidFill>
-                <a:latin typeface="Arial" pitchFamily="-105" charset="0"/>
-                <a:ea typeface="ＭＳ Ｐゴシック" pitchFamily="-105" charset="-128"/>
-                <a:cs typeface="ＭＳ Ｐゴシック" pitchFamily="-105" charset="-128"/>
-              </a:rPr>
-              <a:t/>
-            </a:r>
-            <a:br>
-              <a:rPr lang="en-US" altLang="zh-CN" sz="1800" baseline="0" dirty="0" smtClean="0">
-                <a:solidFill>
-                  <a:srgbClr val="000090"/>
-                </a:solidFill>
-                <a:latin typeface="Arial" pitchFamily="-105" charset="0"/>
-                <a:ea typeface="ＭＳ Ｐゴシック" pitchFamily="-105" charset="-128"/>
-                <a:cs typeface="ＭＳ Ｐゴシック" pitchFamily="-105" charset="-128"/>
-              </a:rPr>
-            </a:br>
-            <a:r>
-              <a:rPr lang="en-US" altLang="zh-CN" sz="1800" baseline="0" dirty="0" smtClean="0">
-                <a:solidFill>
-                  <a:srgbClr val="000090"/>
-                </a:solidFill>
-                <a:latin typeface="Arial" pitchFamily="-105" charset="0"/>
-                <a:ea typeface="ＭＳ Ｐゴシック" pitchFamily="-105" charset="-128"/>
-                <a:cs typeface="ＭＳ Ｐゴシック" pitchFamily="-105" charset="-128"/>
-              </a:rPr>
-              <a:t>Model</a:t>
-            </a:r>
-            <a:endParaRPr kumimoji="0" lang="en-US" sz="1800" i="0" u="none" strike="noStrike" kern="0" cap="none" spc="0" normalizeH="0" baseline="0" noProof="0" dirty="0">
-              <a:ln>
-                <a:noFill/>
-              </a:ln>
-              <a:solidFill>
-                <a:srgbClr val="000090"/>
-              </a:solidFill>
-              <a:effectLst/>
-              <a:uLnTx/>
-              <a:uFillTx/>
-              <a:latin typeface="Calibri"/>
-              <a:ea typeface="+mn-ea"/>
-              <a:cs typeface="+mn-cs"/>
-            </a:endParaRPr>
-          </a:p>
-        </p:txBody>
-      </p:sp>
-      <p:grpSp>
-        <p:nvGrpSpPr>
-          <p:cNvPr id="11" name="Group 10"/>
-          <p:cNvGrpSpPr/>
-          <p:nvPr/>
-        </p:nvGrpSpPr>
-        <p:grpSpPr>
-          <a:xfrm>
-            <a:off x="3173379" y="4716854"/>
-            <a:ext cx="3588651" cy="1321530"/>
-            <a:chOff x="3278081" y="4319980"/>
-            <a:chExt cx="3588651" cy="1321530"/>
-          </a:xfrm>
-        </p:grpSpPr>
-        <p:cxnSp>
-          <p:nvCxnSpPr>
-            <p:cNvPr id="12" name="Straight Arrow Connector 11"/>
-            <p:cNvCxnSpPr>
-              <a:stCxn id="20" idx="0"/>
-            </p:cNvCxnSpPr>
-            <p:nvPr/>
-          </p:nvCxnSpPr>
-          <p:spPr bwMode="auto">
-            <a:xfrm flipH="1" flipV="1">
-              <a:off x="3278081" y="4482101"/>
-              <a:ext cx="1809516" cy="1159409"/>
-            </a:xfrm>
-            <a:prstGeom prst="straightConnector1">
-              <a:avLst/>
-            </a:prstGeom>
-            <a:solidFill>
-              <a:srgbClr val="4F81BD"/>
-            </a:solidFill>
-            <a:ln w="9525" cap="flat" cmpd="sng" algn="ctr">
-              <a:solidFill>
-                <a:sysClr val="windowText" lastClr="000000"/>
-              </a:solidFill>
-              <a:prstDash val="solid"/>
-              <a:round/>
-              <a:headEnd type="none" w="med" len="med"/>
-              <a:tailEnd type="triangle" w="lg" len="med"/>
-            </a:ln>
-            <a:effectLst/>
-          </p:spPr>
-        </p:cxnSp>
-        <p:cxnSp>
-          <p:nvCxnSpPr>
-            <p:cNvPr id="13" name="Straight Arrow Connector 12"/>
-            <p:cNvCxnSpPr>
-              <a:stCxn id="21" idx="0"/>
-            </p:cNvCxnSpPr>
-            <p:nvPr/>
-          </p:nvCxnSpPr>
-          <p:spPr bwMode="auto">
-            <a:xfrm flipH="1" flipV="1">
-              <a:off x="3318615" y="4319980"/>
-              <a:ext cx="3548117" cy="1321530"/>
-            </a:xfrm>
-            <a:prstGeom prst="straightConnector1">
-              <a:avLst/>
-            </a:prstGeom>
-            <a:solidFill>
-              <a:srgbClr val="4F81BD"/>
-            </a:solidFill>
-            <a:ln w="9525" cap="flat" cmpd="sng" algn="ctr">
-              <a:solidFill>
-                <a:sysClr val="windowText" lastClr="000000"/>
-              </a:solidFill>
-              <a:prstDash val="solid"/>
-              <a:round/>
-              <a:headEnd type="none" w="med" len="med"/>
-              <a:tailEnd type="triangle" w="lg" len="med"/>
-            </a:ln>
-            <a:effectLst/>
-          </p:spPr>
-        </p:cxnSp>
-      </p:grpSp>
-      <p:grpSp>
-        <p:nvGrpSpPr>
-          <p:cNvPr id="14" name="Group 13"/>
-          <p:cNvGrpSpPr/>
-          <p:nvPr/>
-        </p:nvGrpSpPr>
-        <p:grpSpPr>
-          <a:xfrm>
-            <a:off x="5307886" y="4795869"/>
-            <a:ext cx="3596091" cy="1204504"/>
-            <a:chOff x="4236079" y="4374576"/>
-            <a:chExt cx="3596091" cy="1204504"/>
-          </a:xfrm>
-        </p:grpSpPr>
-        <p:cxnSp>
-          <p:nvCxnSpPr>
-            <p:cNvPr id="15" name="Straight Arrow Connector 14"/>
-            <p:cNvCxnSpPr/>
-            <p:nvPr/>
-          </p:nvCxnSpPr>
-          <p:spPr bwMode="auto">
-            <a:xfrm flipH="1">
-              <a:off x="4236079" y="4374576"/>
-              <a:ext cx="2203573" cy="1163501"/>
-            </a:xfrm>
-            <a:prstGeom prst="straightConnector1">
-              <a:avLst/>
-            </a:prstGeom>
-            <a:solidFill>
-              <a:srgbClr val="4F81BD"/>
-            </a:solidFill>
-            <a:ln w="9525" cap="flat" cmpd="sng" algn="ctr">
-              <a:solidFill>
-                <a:sysClr val="windowText" lastClr="000000"/>
-              </a:solidFill>
-              <a:prstDash val="solid"/>
-              <a:round/>
-              <a:headEnd type="none" w="med" len="med"/>
-              <a:tailEnd type="triangle" w="lg" len="med"/>
-            </a:ln>
-            <a:effectLst/>
-          </p:spPr>
-        </p:cxnSp>
-        <p:cxnSp>
-          <p:nvCxnSpPr>
-            <p:cNvPr id="16" name="Straight Arrow Connector 15"/>
-            <p:cNvCxnSpPr/>
-            <p:nvPr/>
-          </p:nvCxnSpPr>
-          <p:spPr bwMode="auto">
-            <a:xfrm flipH="1">
-              <a:off x="5856945" y="4377564"/>
-              <a:ext cx="1975225" cy="1201516"/>
-            </a:xfrm>
-            <a:prstGeom prst="straightConnector1">
-              <a:avLst/>
-            </a:prstGeom>
-            <a:solidFill>
-              <a:srgbClr val="4F81BD"/>
-            </a:solidFill>
-            <a:ln w="9525" cap="flat" cmpd="sng" algn="ctr">
-              <a:solidFill>
-                <a:sysClr val="windowText" lastClr="000000"/>
-              </a:solidFill>
-              <a:prstDash val="solid"/>
-              <a:round/>
-              <a:headEnd type="none" w="med" len="med"/>
-              <a:tailEnd type="triangle" w="lg" len="med"/>
-            </a:ln>
-            <a:effectLst/>
-          </p:spPr>
-        </p:cxnSp>
-      </p:grpSp>
-      <p:pic>
-        <p:nvPicPr>
-          <p:cNvPr id="17" name="Picture 16"/>
-          <p:cNvPicPr>
-            <a:picLocks noChangeAspect="1"/>
-          </p:cNvPicPr>
-          <p:nvPr/>
-        </p:nvPicPr>
-        <p:blipFill>
-          <a:blip r:embed="rId2" cstate="print">
-            <a:extLst>
-              <a:ext uri="{28A0092B-C50C-407E-A947-70E740481C1C}">
-                <a14:useLocalDpi xmlns:a14="http://schemas.microsoft.com/office/drawing/2010/main"/>
-              </a:ext>
-            </a:extLst>
-          </a:blip>
-          <a:stretch>
-            <a:fillRect/>
-          </a:stretch>
-        </p:blipFill>
-        <p:spPr>
-          <a:xfrm>
-            <a:off x="4286630" y="5959370"/>
-            <a:ext cx="1445692" cy="609600"/>
-          </a:xfrm>
-          <a:prstGeom prst="rect">
-            <a:avLst/>
-          </a:prstGeom>
-        </p:spPr>
-      </p:pic>
-      <p:pic>
-        <p:nvPicPr>
-          <p:cNvPr id="18" name="Picture 17"/>
-          <p:cNvPicPr>
-            <a:picLocks noChangeAspect="1"/>
-          </p:cNvPicPr>
-          <p:nvPr/>
-        </p:nvPicPr>
-        <p:blipFill>
-          <a:blip r:embed="rId2" cstate="print">
-            <a:extLst>
-              <a:ext uri="{28A0092B-C50C-407E-A947-70E740481C1C}">
-                <a14:useLocalDpi xmlns:a14="http://schemas.microsoft.com/office/drawing/2010/main"/>
-              </a:ext>
-            </a:extLst>
-          </a:blip>
-          <a:stretch>
-            <a:fillRect/>
-          </a:stretch>
-        </p:blipFill>
-        <p:spPr>
-          <a:xfrm>
-            <a:off x="6065765" y="5959370"/>
-            <a:ext cx="1445692" cy="609600"/>
-          </a:xfrm>
-          <a:prstGeom prst="rect">
-            <a:avLst/>
-          </a:prstGeom>
-        </p:spPr>
-      </p:pic>
-      <p:sp>
-        <p:nvSpPr>
-          <p:cNvPr id="19" name="Rectangle 18"/>
-          <p:cNvSpPr/>
-          <p:nvPr/>
-        </p:nvSpPr>
-        <p:spPr>
-          <a:xfrm>
-            <a:off x="4973333" y="3869926"/>
-            <a:ext cx="1165411" cy="808144"/>
-          </a:xfrm>
-          <a:prstGeom prst="rect">
-            <a:avLst/>
-          </a:prstGeom>
-          <a:gradFill rotWithShape="1">
-            <a:gsLst>
-              <a:gs pos="0">
-                <a:srgbClr val="9E9273">
-                  <a:tint val="100000"/>
-                  <a:shade val="100000"/>
-                  <a:satMod val="130000"/>
-                </a:srgbClr>
-              </a:gs>
-              <a:gs pos="100000">
-                <a:srgbClr val="9E9273">
-                  <a:tint val="50000"/>
-                  <a:shade val="100000"/>
-                  <a:satMod val="350000"/>
-                </a:srgbClr>
-              </a:gs>
-            </a:gsLst>
-            <a:lin ang="16200000" scaled="0"/>
-          </a:gradFill>
-          <a:ln>
-            <a:noFill/>
-          </a:ln>
-          <a:effectLst>
-            <a:outerShdw blurRad="40000" dist="23000" dir="5400000" rotWithShape="0">
-              <a:srgbClr val="000000">
-                <a:alpha val="35000"/>
-              </a:srgbClr>
-            </a:outerShdw>
-          </a:effectLst>
-          <a:scene3d>
-            <a:camera prst="orthographicFront">
-              <a:rot lat="0" lon="0" rev="0"/>
-            </a:camera>
-            <a:lightRig rig="threePt" dir="t">
-              <a:rot lat="0" lon="0" rev="1200000"/>
-            </a:lightRig>
-          </a:scene3d>
-          <a:sp3d>
-            <a:bevelT w="63500" h="25400"/>
-          </a:sp3d>
-        </p:spPr>
-        <p:txBody>
-          <a:bodyPr tIns="18288" rtlCol="0" anchor="ctr"/>
-          <a:lstStyle/>
-          <a:p>
-            <a:pPr algn="ctr" eaLnBrk="1" fontAlgn="auto" hangingPunct="1">
-              <a:spcBef>
-                <a:spcPts val="0"/>
-              </a:spcBef>
-              <a:spcAft>
-                <a:spcPts val="0"/>
-              </a:spcAft>
-            </a:pPr>
-            <a:r>
-              <a:rPr lang="en-US" altLang="zh-CN" sz="2000" baseline="0" dirty="0" smtClean="0">
-                <a:solidFill>
-                  <a:srgbClr val="000090"/>
-                </a:solidFill>
-                <a:latin typeface="Arial" pitchFamily="-105" charset="0"/>
-                <a:ea typeface="ＭＳ Ｐゴシック" pitchFamily="-105" charset="-128"/>
-                <a:cs typeface="ＭＳ Ｐゴシック" pitchFamily="-105" charset="-128"/>
-              </a:rPr>
-              <a:t>Program</a:t>
-            </a:r>
-            <a:br>
-              <a:rPr lang="en-US" altLang="zh-CN" sz="2000" baseline="0" dirty="0" smtClean="0">
-                <a:solidFill>
-                  <a:srgbClr val="000090"/>
-                </a:solidFill>
-                <a:latin typeface="Arial" pitchFamily="-105" charset="0"/>
-                <a:ea typeface="ＭＳ Ｐゴシック" pitchFamily="-105" charset="-128"/>
-                <a:cs typeface="ＭＳ Ｐゴシック" pitchFamily="-105" charset="-128"/>
-              </a:rPr>
-            </a:br>
-            <a:r>
-              <a:rPr lang="en-US" altLang="zh-CN" sz="2000" baseline="0" dirty="0" smtClean="0">
-                <a:solidFill>
-                  <a:srgbClr val="000090"/>
-                </a:solidFill>
-                <a:latin typeface="Arial" pitchFamily="-105" charset="0"/>
-                <a:ea typeface="ＭＳ Ｐゴシック" pitchFamily="-105" charset="-128"/>
-                <a:cs typeface="ＭＳ Ｐゴシック" pitchFamily="-105" charset="-128"/>
-              </a:rPr>
-              <a:t>Logic</a:t>
-            </a:r>
-            <a:endParaRPr kumimoji="0" lang="en-US" sz="2000" i="0" u="none" strike="noStrike" kern="0" cap="none" spc="0" normalizeH="0" baseline="0" noProof="0" dirty="0">
-              <a:ln>
-                <a:noFill/>
-              </a:ln>
-              <a:solidFill>
-                <a:srgbClr val="000090"/>
-              </a:solidFill>
-              <a:effectLst/>
-              <a:uLnTx/>
-              <a:uFillTx/>
-              <a:latin typeface="Calibri"/>
-              <a:ea typeface="+mn-ea"/>
-              <a:cs typeface="+mn-cs"/>
-            </a:endParaRPr>
-          </a:p>
-        </p:txBody>
-      </p:sp>
-      <p:cxnSp>
-        <p:nvCxnSpPr>
-          <p:cNvPr id="20" name="Straight Arrow Connector 19"/>
-          <p:cNvCxnSpPr/>
-          <p:nvPr/>
-        </p:nvCxnSpPr>
-        <p:spPr bwMode="auto">
-          <a:xfrm>
-            <a:off x="3213471" y="3718843"/>
-            <a:ext cx="1759862" cy="555155"/>
-          </a:xfrm>
-          <a:prstGeom prst="straightConnector1">
-            <a:avLst/>
-          </a:prstGeom>
-          <a:solidFill>
-            <a:srgbClr val="4F81BD"/>
-          </a:solidFill>
-          <a:ln w="9525" cap="flat" cmpd="sng" algn="ctr">
-            <a:solidFill>
-              <a:sysClr val="windowText" lastClr="000000"/>
-            </a:solidFill>
-            <a:prstDash val="solid"/>
-            <a:round/>
-            <a:headEnd type="none" w="med" len="med"/>
-            <a:tailEnd type="triangle" w="lg" len="med"/>
-          </a:ln>
-          <a:effectLst/>
-        </p:spPr>
-      </p:cxnSp>
-      <p:cxnSp>
-        <p:nvCxnSpPr>
-          <p:cNvPr id="21" name="Straight Arrow Connector 20"/>
-          <p:cNvCxnSpPr/>
-          <p:nvPr/>
-        </p:nvCxnSpPr>
-        <p:spPr bwMode="auto">
-          <a:xfrm flipV="1">
-            <a:off x="6138744" y="4259561"/>
-            <a:ext cx="614776" cy="14437"/>
-          </a:xfrm>
-          <a:prstGeom prst="straightConnector1">
-            <a:avLst/>
-          </a:prstGeom>
-          <a:solidFill>
-            <a:srgbClr val="4F81BD"/>
-          </a:solidFill>
-          <a:ln w="9525" cap="flat" cmpd="sng" algn="ctr">
-            <a:solidFill>
-              <a:sysClr val="windowText" lastClr="000000"/>
-            </a:solidFill>
-            <a:prstDash val="solid"/>
-            <a:round/>
-            <a:headEnd type="none" w="med" len="med"/>
-            <a:tailEnd type="triangle" w="lg" len="med"/>
-          </a:ln>
-          <a:effectLst/>
-        </p:spPr>
-      </p:cxnSp>
-      <p:cxnSp>
-        <p:nvCxnSpPr>
-          <p:cNvPr id="22" name="Straight Arrow Connector 21"/>
-          <p:cNvCxnSpPr/>
-          <p:nvPr/>
-        </p:nvCxnSpPr>
-        <p:spPr bwMode="auto">
-          <a:xfrm flipV="1">
-            <a:off x="3226983" y="4273998"/>
-            <a:ext cx="1746350" cy="363842"/>
-          </a:xfrm>
-          <a:prstGeom prst="straightConnector1">
-            <a:avLst/>
-          </a:prstGeom>
-          <a:solidFill>
-            <a:srgbClr val="4F81BD"/>
-          </a:solidFill>
-          <a:ln w="9525" cap="flat" cmpd="sng" algn="ctr">
-            <a:solidFill>
-              <a:sysClr val="windowText" lastClr="000000"/>
-            </a:solidFill>
-            <a:prstDash val="solid"/>
-            <a:round/>
-            <a:headEnd type="none" w="med" len="med"/>
-            <a:tailEnd type="triangle" w="lg" len="med"/>
-          </a:ln>
-          <a:effectLst/>
-        </p:spPr>
-      </p:cxnSp>
-    </p:spTree>
-    <p:extLst>
-      <p:ext uri="{BB962C8B-B14F-4D97-AF65-F5344CB8AC3E}">
-        <p14:creationId xmlns:p14="http://schemas.microsoft.com/office/powerpoint/2010/main" val="340410705"/>
-      </p:ext>
-    </p:extLst>
   </p:cSld>
   <p:clrMapOvr>
     <a:masterClrMapping/>

</xml_diff>